<commit_message>
Modified 'part 1 - sequence and data - method call' slideshow to fit the new format. Minor fixes to sequence method call.
</commit_message>
<xml_diff>
--- a/resources/ppt-slides/sequence-data-sequence.pptx
+++ b/resources/ppt-slides/sequence-data-sequence.pptx
@@ -5659,6 +5659,44 @@
           </a:p>
         </p:txBody>
       </p:sp>
+      <p:sp>
+        <p:nvSpPr>
+          <p:cNvPr id="19" name="TextBox 18">
+            <a:extLst>
+              <a:ext uri="{FF2B5EF4-FFF2-40B4-BE49-F238E27FC236}">
+                <a16:creationId xmlns:a16="http://schemas.microsoft.com/office/drawing/2014/main" id="{BBC4C83A-5166-58A4-1F2A-B52ADEC80AEE}"/>
+              </a:ext>
+            </a:extLst>
+          </p:cNvPr>
+          <p:cNvSpPr txBox="1"/>
+          <p:nvPr/>
+        </p:nvSpPr>
+        <p:spPr>
+          <a:xfrm>
+            <a:off x="156485" y="224498"/>
+            <a:ext cx="4829319" cy="369332"/>
+          </a:xfrm>
+          <a:prstGeom prst="rect">
+            <a:avLst/>
+          </a:prstGeom>
+          <a:noFill/>
+        </p:spPr>
+        <p:txBody>
+          <a:bodyPr wrap="square">
+            <a:spAutoFit/>
+          </a:bodyPr>
+          <a:lstStyle/>
+          <a:p>
+            <a:r>
+              <a:rPr lang="en-US" dirty="0">
+                <a:latin typeface="Gaegu" pitchFamily="2" charset="0"/>
+              </a:rPr>
+              <a:t>Program Execution and Sequence</a:t>
+            </a:r>
+            <a:endParaRPr lang="en-US" b="1" dirty="0"/>
+          </a:p>
+        </p:txBody>
+      </p:sp>
     </p:spTree>
     <p:extLst>
       <p:ext uri="{BB962C8B-B14F-4D97-AF65-F5344CB8AC3E}">
@@ -7788,60 +7826,44 @@
           <a:custGeom>
             <a:avLst/>
             <a:gdLst>
-              <a:gd name="connsiteX0" fmla="*/ 0 w 6685443"/>
-              <a:gd name="connsiteY0" fmla="*/ 0 h 1815499"/>
-              <a:gd name="connsiteX1" fmla="*/ 601690 w 6685443"/>
-              <a:gd name="connsiteY1" fmla="*/ 0 h 1815499"/>
-              <a:gd name="connsiteX2" fmla="*/ 1069671 w 6685443"/>
-              <a:gd name="connsiteY2" fmla="*/ 0 h 1815499"/>
-              <a:gd name="connsiteX3" fmla="*/ 1871924 w 6685443"/>
-              <a:gd name="connsiteY3" fmla="*/ 0 h 1815499"/>
-              <a:gd name="connsiteX4" fmla="*/ 2473614 w 6685443"/>
-              <a:gd name="connsiteY4" fmla="*/ 0 h 1815499"/>
-              <a:gd name="connsiteX5" fmla="*/ 3075304 w 6685443"/>
-              <a:gd name="connsiteY5" fmla="*/ 0 h 1815499"/>
-              <a:gd name="connsiteX6" fmla="*/ 3877557 w 6685443"/>
-              <a:gd name="connsiteY6" fmla="*/ 0 h 1815499"/>
-              <a:gd name="connsiteX7" fmla="*/ 4412392 w 6685443"/>
-              <a:gd name="connsiteY7" fmla="*/ 0 h 1815499"/>
-              <a:gd name="connsiteX8" fmla="*/ 5214646 w 6685443"/>
-              <a:gd name="connsiteY8" fmla="*/ 0 h 1815499"/>
-              <a:gd name="connsiteX9" fmla="*/ 6016899 w 6685443"/>
-              <a:gd name="connsiteY9" fmla="*/ 0 h 1815499"/>
-              <a:gd name="connsiteX10" fmla="*/ 6685443 w 6685443"/>
-              <a:gd name="connsiteY10" fmla="*/ 0 h 1815499"/>
-              <a:gd name="connsiteX11" fmla="*/ 6685443 w 6685443"/>
-              <a:gd name="connsiteY11" fmla="*/ 641476 h 1815499"/>
-              <a:gd name="connsiteX12" fmla="*/ 6685443 w 6685443"/>
-              <a:gd name="connsiteY12" fmla="*/ 1264798 h 1815499"/>
-              <a:gd name="connsiteX13" fmla="*/ 6685443 w 6685443"/>
-              <a:gd name="connsiteY13" fmla="*/ 1815499 h 1815499"/>
-              <a:gd name="connsiteX14" fmla="*/ 6016899 w 6685443"/>
-              <a:gd name="connsiteY14" fmla="*/ 1815499 h 1815499"/>
-              <a:gd name="connsiteX15" fmla="*/ 5482063 w 6685443"/>
-              <a:gd name="connsiteY15" fmla="*/ 1815499 h 1815499"/>
-              <a:gd name="connsiteX16" fmla="*/ 4813519 w 6685443"/>
-              <a:gd name="connsiteY16" fmla="*/ 1815499 h 1815499"/>
-              <a:gd name="connsiteX17" fmla="*/ 4011266 w 6685443"/>
-              <a:gd name="connsiteY17" fmla="*/ 1815499 h 1815499"/>
-              <a:gd name="connsiteX18" fmla="*/ 3342722 w 6685443"/>
-              <a:gd name="connsiteY18" fmla="*/ 1815499 h 1815499"/>
-              <a:gd name="connsiteX19" fmla="*/ 2874740 w 6685443"/>
-              <a:gd name="connsiteY19" fmla="*/ 1815499 h 1815499"/>
-              <a:gd name="connsiteX20" fmla="*/ 2339905 w 6685443"/>
-              <a:gd name="connsiteY20" fmla="*/ 1815499 h 1815499"/>
-              <a:gd name="connsiteX21" fmla="*/ 1537652 w 6685443"/>
-              <a:gd name="connsiteY21" fmla="*/ 1815499 h 1815499"/>
-              <a:gd name="connsiteX22" fmla="*/ 869108 w 6685443"/>
-              <a:gd name="connsiteY22" fmla="*/ 1815499 h 1815499"/>
-              <a:gd name="connsiteX23" fmla="*/ 0 w 6685443"/>
-              <a:gd name="connsiteY23" fmla="*/ 1815499 h 1815499"/>
-              <a:gd name="connsiteX24" fmla="*/ 0 w 6685443"/>
-              <a:gd name="connsiteY24" fmla="*/ 1210333 h 1815499"/>
-              <a:gd name="connsiteX25" fmla="*/ 0 w 6685443"/>
-              <a:gd name="connsiteY25" fmla="*/ 659631 h 1815499"/>
-              <a:gd name="connsiteX26" fmla="*/ 0 w 6685443"/>
-              <a:gd name="connsiteY26" fmla="*/ 0 h 1815499"/>
+              <a:gd name="connsiteX0" fmla="*/ 0 w 3984158"/>
+              <a:gd name="connsiteY0" fmla="*/ 0 h 1483208"/>
+              <a:gd name="connsiteX1" fmla="*/ 624185 w 3984158"/>
+              <a:gd name="connsiteY1" fmla="*/ 0 h 1483208"/>
+              <a:gd name="connsiteX2" fmla="*/ 1168686 w 3984158"/>
+              <a:gd name="connsiteY2" fmla="*/ 0 h 1483208"/>
+              <a:gd name="connsiteX3" fmla="*/ 1912396 w 3984158"/>
+              <a:gd name="connsiteY3" fmla="*/ 0 h 1483208"/>
+              <a:gd name="connsiteX4" fmla="*/ 2536581 w 3984158"/>
+              <a:gd name="connsiteY4" fmla="*/ 0 h 1483208"/>
+              <a:gd name="connsiteX5" fmla="*/ 3160765 w 3984158"/>
+              <a:gd name="connsiteY5" fmla="*/ 0 h 1483208"/>
+              <a:gd name="connsiteX6" fmla="*/ 3984158 w 3984158"/>
+              <a:gd name="connsiteY6" fmla="*/ 0 h 1483208"/>
+              <a:gd name="connsiteX7" fmla="*/ 3984158 w 3984158"/>
+              <a:gd name="connsiteY7" fmla="*/ 464739 h 1483208"/>
+              <a:gd name="connsiteX8" fmla="*/ 3984158 w 3984158"/>
+              <a:gd name="connsiteY8" fmla="*/ 959141 h 1483208"/>
+              <a:gd name="connsiteX9" fmla="*/ 3984158 w 3984158"/>
+              <a:gd name="connsiteY9" fmla="*/ 1483208 h 1483208"/>
+              <a:gd name="connsiteX10" fmla="*/ 3399815 w 3984158"/>
+              <a:gd name="connsiteY10" fmla="*/ 1483208 h 1483208"/>
+              <a:gd name="connsiteX11" fmla="*/ 2735788 w 3984158"/>
+              <a:gd name="connsiteY11" fmla="*/ 1483208 h 1483208"/>
+              <a:gd name="connsiteX12" fmla="*/ 2111604 w 3984158"/>
+              <a:gd name="connsiteY12" fmla="*/ 1483208 h 1483208"/>
+              <a:gd name="connsiteX13" fmla="*/ 1367894 w 3984158"/>
+              <a:gd name="connsiteY13" fmla="*/ 1483208 h 1483208"/>
+              <a:gd name="connsiteX14" fmla="*/ 624185 w 3984158"/>
+              <a:gd name="connsiteY14" fmla="*/ 1483208 h 1483208"/>
+              <a:gd name="connsiteX15" fmla="*/ 0 w 3984158"/>
+              <a:gd name="connsiteY15" fmla="*/ 1483208 h 1483208"/>
+              <a:gd name="connsiteX16" fmla="*/ 0 w 3984158"/>
+              <a:gd name="connsiteY16" fmla="*/ 988805 h 1483208"/>
+              <a:gd name="connsiteX17" fmla="*/ 0 w 3984158"/>
+              <a:gd name="connsiteY17" fmla="*/ 509235 h 1483208"/>
+              <a:gd name="connsiteX18" fmla="*/ 0 w 3984158"/>
+              <a:gd name="connsiteY18" fmla="*/ 0 h 1483208"/>
             </a:gdLst>
             <a:ahLst/>
             <a:cxnLst>
@@ -7902,165 +7924,101 @@
               <a:cxn ang="0">
                 <a:pos x="connsiteX18" y="connsiteY18"/>
               </a:cxn>
-              <a:cxn ang="0">
-                <a:pos x="connsiteX19" y="connsiteY19"/>
-              </a:cxn>
-              <a:cxn ang="0">
-                <a:pos x="connsiteX20" y="connsiteY20"/>
-              </a:cxn>
-              <a:cxn ang="0">
-                <a:pos x="connsiteX21" y="connsiteY21"/>
-              </a:cxn>
-              <a:cxn ang="0">
-                <a:pos x="connsiteX22" y="connsiteY22"/>
-              </a:cxn>
-              <a:cxn ang="0">
-                <a:pos x="connsiteX23" y="connsiteY23"/>
-              </a:cxn>
-              <a:cxn ang="0">
-                <a:pos x="connsiteX24" y="connsiteY24"/>
-              </a:cxn>
-              <a:cxn ang="0">
-                <a:pos x="connsiteX25" y="connsiteY25"/>
-              </a:cxn>
-              <a:cxn ang="0">
-                <a:pos x="connsiteX26" y="connsiteY26"/>
-              </a:cxn>
             </a:cxnLst>
             <a:rect l="l" t="t" r="r" b="b"/>
             <a:pathLst>
-              <a:path w="6685443" h="1815499" extrusionOk="0">
+              <a:path w="3984158" h="1483208" extrusionOk="0">
                 <a:moveTo>
                   <a:pt x="0" y="0"/>
                 </a:moveTo>
                 <a:cubicBezTo>
-                  <a:pt x="197687" y="5421"/>
-                  <a:pt x="392637" y="-27165"/>
-                  <a:pt x="601690" y="0"/>
-                </a:cubicBezTo>
-                <a:cubicBezTo>
-                  <a:pt x="810743" y="27165"/>
-                  <a:pt x="967174" y="20034"/>
-                  <a:pt x="1069671" y="0"/>
-                </a:cubicBezTo>
-                <a:cubicBezTo>
-                  <a:pt x="1172168" y="-20034"/>
-                  <a:pt x="1481114" y="26288"/>
-                  <a:pt x="1871924" y="0"/>
-                </a:cubicBezTo>
-                <a:cubicBezTo>
-                  <a:pt x="2262734" y="-26288"/>
-                  <a:pt x="2275646" y="9816"/>
-                  <a:pt x="2473614" y="0"/>
-                </a:cubicBezTo>
-                <a:cubicBezTo>
-                  <a:pt x="2671582" y="-9816"/>
-                  <a:pt x="2837715" y="-16866"/>
-                  <a:pt x="3075304" y="0"/>
-                </a:cubicBezTo>
-                <a:cubicBezTo>
-                  <a:pt x="3312893" y="16866"/>
-                  <a:pt x="3565082" y="13656"/>
-                  <a:pt x="3877557" y="0"/>
-                </a:cubicBezTo>
-                <a:cubicBezTo>
-                  <a:pt x="4190032" y="-13656"/>
-                  <a:pt x="4275680" y="23045"/>
-                  <a:pt x="4412392" y="0"/>
-                </a:cubicBezTo>
-                <a:cubicBezTo>
-                  <a:pt x="4549105" y="-23045"/>
-                  <a:pt x="4974381" y="13533"/>
-                  <a:pt x="5214646" y="0"/>
-                </a:cubicBezTo>
-                <a:cubicBezTo>
-                  <a:pt x="5454911" y="-13533"/>
-                  <a:pt x="5621382" y="6072"/>
-                  <a:pt x="6016899" y="0"/>
-                </a:cubicBezTo>
-                <a:cubicBezTo>
-                  <a:pt x="6412416" y="-6072"/>
-                  <a:pt x="6368099" y="-22480"/>
-                  <a:pt x="6685443" y="0"/>
-                </a:cubicBezTo>
-                <a:cubicBezTo>
-                  <a:pt x="6675060" y="141143"/>
-                  <a:pt x="6688790" y="422707"/>
-                  <a:pt x="6685443" y="641476"/>
-                </a:cubicBezTo>
-                <a:cubicBezTo>
-                  <a:pt x="6682096" y="860245"/>
-                  <a:pt x="6676921" y="1110529"/>
-                  <a:pt x="6685443" y="1264798"/>
-                </a:cubicBezTo>
-                <a:cubicBezTo>
-                  <a:pt x="6693965" y="1419067"/>
-                  <a:pt x="6712438" y="1626237"/>
-                  <a:pt x="6685443" y="1815499"/>
-                </a:cubicBezTo>
-                <a:cubicBezTo>
-                  <a:pt x="6531485" y="1826631"/>
-                  <a:pt x="6258288" y="1826162"/>
-                  <a:pt x="6016899" y="1815499"/>
-                </a:cubicBezTo>
-                <a:cubicBezTo>
-                  <a:pt x="5775510" y="1804836"/>
-                  <a:pt x="5635687" y="1808580"/>
-                  <a:pt x="5482063" y="1815499"/>
-                </a:cubicBezTo>
-                <a:cubicBezTo>
-                  <a:pt x="5328439" y="1822418"/>
-                  <a:pt x="4969533" y="1798322"/>
-                  <a:pt x="4813519" y="1815499"/>
-                </a:cubicBezTo>
-                <a:cubicBezTo>
-                  <a:pt x="4657505" y="1832676"/>
-                  <a:pt x="4277484" y="1797792"/>
-                  <a:pt x="4011266" y="1815499"/>
-                </a:cubicBezTo>
-                <a:cubicBezTo>
-                  <a:pt x="3745048" y="1833206"/>
-                  <a:pt x="3503887" y="1798854"/>
-                  <a:pt x="3342722" y="1815499"/>
-                </a:cubicBezTo>
-                <a:cubicBezTo>
-                  <a:pt x="3181557" y="1832144"/>
-                  <a:pt x="3094655" y="1808958"/>
-                  <a:pt x="2874740" y="1815499"/>
-                </a:cubicBezTo>
-                <a:cubicBezTo>
-                  <a:pt x="2654825" y="1822040"/>
-                  <a:pt x="2552356" y="1810430"/>
-                  <a:pt x="2339905" y="1815499"/>
-                </a:cubicBezTo>
-                <a:cubicBezTo>
-                  <a:pt x="2127454" y="1820568"/>
-                  <a:pt x="1825409" y="1807327"/>
-                  <a:pt x="1537652" y="1815499"/>
-                </a:cubicBezTo>
-                <a:cubicBezTo>
-                  <a:pt x="1249895" y="1823671"/>
-                  <a:pt x="1086879" y="1834794"/>
-                  <a:pt x="869108" y="1815499"/>
-                </a:cubicBezTo>
-                <a:cubicBezTo>
-                  <a:pt x="651337" y="1796204"/>
-                  <a:pt x="264417" y="1828267"/>
-                  <a:pt x="0" y="1815499"/>
-                </a:cubicBezTo>
-                <a:cubicBezTo>
-                  <a:pt x="8313" y="1520428"/>
-                  <a:pt x="-1936" y="1449694"/>
-                  <a:pt x="0" y="1210333"/>
-                </a:cubicBezTo>
-                <a:cubicBezTo>
-                  <a:pt x="1936" y="970972"/>
-                  <a:pt x="16209" y="905402"/>
-                  <a:pt x="0" y="659631"/>
-                </a:cubicBezTo>
-                <a:cubicBezTo>
-                  <a:pt x="-16209" y="413860"/>
-                  <a:pt x="-15680" y="309233"/>
+                  <a:pt x="183423" y="18876"/>
+                  <a:pt x="387432" y="11885"/>
+                  <a:pt x="624185" y="0"/>
+                </a:cubicBezTo>
+                <a:cubicBezTo>
+                  <a:pt x="860939" y="-11885"/>
+                  <a:pt x="1054606" y="-18463"/>
+                  <a:pt x="1168686" y="0"/>
+                </a:cubicBezTo>
+                <a:cubicBezTo>
+                  <a:pt x="1282766" y="18463"/>
+                  <a:pt x="1693901" y="35828"/>
+                  <a:pt x="1912396" y="0"/>
+                </a:cubicBezTo>
+                <a:cubicBezTo>
+                  <a:pt x="2130891" y="-35828"/>
+                  <a:pt x="2399161" y="-14960"/>
+                  <a:pt x="2536581" y="0"/>
+                </a:cubicBezTo>
+                <a:cubicBezTo>
+                  <a:pt x="2674002" y="14960"/>
+                  <a:pt x="2930878" y="25357"/>
+                  <a:pt x="3160765" y="0"/>
+                </a:cubicBezTo>
+                <a:cubicBezTo>
+                  <a:pt x="3390652" y="-25357"/>
+                  <a:pt x="3618233" y="22549"/>
+                  <a:pt x="3984158" y="0"/>
+                </a:cubicBezTo>
+                <a:cubicBezTo>
+                  <a:pt x="3984038" y="195374"/>
+                  <a:pt x="3982039" y="245726"/>
+                  <a:pt x="3984158" y="464739"/>
+                </a:cubicBezTo>
+                <a:cubicBezTo>
+                  <a:pt x="3986277" y="683752"/>
+                  <a:pt x="3968175" y="738445"/>
+                  <a:pt x="3984158" y="959141"/>
+                </a:cubicBezTo>
+                <a:cubicBezTo>
+                  <a:pt x="4000141" y="1179837"/>
+                  <a:pt x="4006929" y="1289598"/>
+                  <a:pt x="3984158" y="1483208"/>
+                </a:cubicBezTo>
+                <a:cubicBezTo>
+                  <a:pt x="3803422" y="1507410"/>
+                  <a:pt x="3621945" y="1507539"/>
+                  <a:pt x="3399815" y="1483208"/>
+                </a:cubicBezTo>
+                <a:cubicBezTo>
+                  <a:pt x="3177685" y="1458877"/>
+                  <a:pt x="2949391" y="1453742"/>
+                  <a:pt x="2735788" y="1483208"/>
+                </a:cubicBezTo>
+                <a:cubicBezTo>
+                  <a:pt x="2522185" y="1512674"/>
+                  <a:pt x="2346462" y="1470132"/>
+                  <a:pt x="2111604" y="1483208"/>
+                </a:cubicBezTo>
+                <a:cubicBezTo>
+                  <a:pt x="1876746" y="1496284"/>
+                  <a:pt x="1574870" y="1492723"/>
+                  <a:pt x="1367894" y="1483208"/>
+                </a:cubicBezTo>
+                <a:cubicBezTo>
+                  <a:pt x="1160918" y="1473694"/>
+                  <a:pt x="788357" y="1457438"/>
+                  <a:pt x="624185" y="1483208"/>
+                </a:cubicBezTo>
+                <a:cubicBezTo>
+                  <a:pt x="460013" y="1508978"/>
+                  <a:pt x="282889" y="1481339"/>
+                  <a:pt x="0" y="1483208"/>
+                </a:cubicBezTo>
+                <a:cubicBezTo>
+                  <a:pt x="24368" y="1316907"/>
+                  <a:pt x="-24567" y="1129752"/>
+                  <a:pt x="0" y="988805"/>
+                </a:cubicBezTo>
+                <a:cubicBezTo>
+                  <a:pt x="24567" y="847858"/>
+                  <a:pt x="2696" y="683175"/>
+                  <a:pt x="0" y="509235"/>
+                </a:cubicBezTo>
+                <a:cubicBezTo>
+                  <a:pt x="-2696" y="335295"/>
+                  <a:pt x="22160" y="109840"/>
                   <a:pt x="0" y="0"/>
                 </a:cubicBezTo>
                 <a:close/>
@@ -8304,6 +8262,44 @@
               <a:rPr lang="en-US" dirty="0"/>
               <a:t>./hello-world</a:t>
             </a:r>
+          </a:p>
+        </p:txBody>
+      </p:sp>
+      <p:sp>
+        <p:nvSpPr>
+          <p:cNvPr id="3" name="TextBox 2">
+            <a:extLst>
+              <a:ext uri="{FF2B5EF4-FFF2-40B4-BE49-F238E27FC236}">
+                <a16:creationId xmlns:a16="http://schemas.microsoft.com/office/drawing/2014/main" id="{60459823-A484-EC6A-8881-6DECE32BE3BF}"/>
+              </a:ext>
+            </a:extLst>
+          </p:cNvPr>
+          <p:cNvSpPr txBox="1"/>
+          <p:nvPr/>
+        </p:nvSpPr>
+        <p:spPr>
+          <a:xfrm>
+            <a:off x="156485" y="224498"/>
+            <a:ext cx="4829319" cy="369332"/>
+          </a:xfrm>
+          <a:prstGeom prst="rect">
+            <a:avLst/>
+          </a:prstGeom>
+          <a:noFill/>
+        </p:spPr>
+        <p:txBody>
+          <a:bodyPr wrap="square">
+            <a:spAutoFit/>
+          </a:bodyPr>
+          <a:lstStyle/>
+          <a:p>
+            <a:r>
+              <a:rPr lang="en-US" dirty="0">
+                <a:latin typeface="Gaegu" pitchFamily="2" charset="0"/>
+              </a:rPr>
+              <a:t>Program Execution and Sequence</a:t>
+            </a:r>
+            <a:endParaRPr lang="en-US" b="1" dirty="0"/>
           </a:p>
         </p:txBody>
       </p:sp>
@@ -9950,7 +9946,13 @@
               <a:buAutoNum type="arabicPeriod"/>
             </a:pPr>
             <a:r>
-              <a:rPr lang="en-US" dirty="0"/>
+              <a:rPr lang="en-US" dirty="0">
+                <a:solidFill>
+                  <a:schemeClr val="bg1">
+                    <a:lumMod val="65000"/>
+                  </a:schemeClr>
+                </a:solidFill>
+              </a:rPr>
               <a:t>0010</a:t>
             </a:r>
           </a:p>
@@ -9960,7 +9962,13 @@
               <a:buAutoNum type="arabicPeriod"/>
             </a:pPr>
             <a:r>
-              <a:rPr lang="en-US" dirty="0"/>
+              <a:rPr lang="en-US" dirty="0">
+                <a:solidFill>
+                  <a:schemeClr val="bg1">
+                    <a:lumMod val="65000"/>
+                  </a:schemeClr>
+                </a:solidFill>
+              </a:rPr>
               <a:t>1010</a:t>
             </a:r>
           </a:p>
@@ -9970,7 +9978,13 @@
               <a:buAutoNum type="arabicPeriod"/>
             </a:pPr>
             <a:r>
-              <a:rPr lang="en-US" dirty="0"/>
+              <a:rPr lang="en-US" dirty="0">
+                <a:solidFill>
+                  <a:schemeClr val="bg1">
+                    <a:lumMod val="65000"/>
+                  </a:schemeClr>
+                </a:solidFill>
+              </a:rPr>
               <a:t>1101</a:t>
             </a:r>
           </a:p>
@@ -9980,7 +9994,13 @@
               <a:buAutoNum type="arabicPeriod"/>
             </a:pPr>
             <a:r>
-              <a:rPr lang="en-US" dirty="0"/>
+              <a:rPr lang="en-US" dirty="0">
+                <a:solidFill>
+                  <a:schemeClr val="bg1">
+                    <a:lumMod val="65000"/>
+                  </a:schemeClr>
+                </a:solidFill>
+              </a:rPr>
               <a:t>1111</a:t>
             </a:r>
           </a:p>
@@ -9990,7 +10010,13 @@
               <a:buAutoNum type="arabicPeriod"/>
             </a:pPr>
             <a:r>
-              <a:rPr lang="en-US" dirty="0"/>
+              <a:rPr lang="en-US" dirty="0">
+                <a:solidFill>
+                  <a:schemeClr val="bg1">
+                    <a:lumMod val="65000"/>
+                  </a:schemeClr>
+                </a:solidFill>
+              </a:rPr>
               <a:t>1001</a:t>
             </a:r>
           </a:p>
@@ -10535,60 +10561,44 @@
           <a:custGeom>
             <a:avLst/>
             <a:gdLst>
-              <a:gd name="connsiteX0" fmla="*/ 0 w 6685443"/>
-              <a:gd name="connsiteY0" fmla="*/ 0 h 1815499"/>
-              <a:gd name="connsiteX1" fmla="*/ 601690 w 6685443"/>
-              <a:gd name="connsiteY1" fmla="*/ 0 h 1815499"/>
-              <a:gd name="connsiteX2" fmla="*/ 1069671 w 6685443"/>
-              <a:gd name="connsiteY2" fmla="*/ 0 h 1815499"/>
-              <a:gd name="connsiteX3" fmla="*/ 1871924 w 6685443"/>
-              <a:gd name="connsiteY3" fmla="*/ 0 h 1815499"/>
-              <a:gd name="connsiteX4" fmla="*/ 2473614 w 6685443"/>
-              <a:gd name="connsiteY4" fmla="*/ 0 h 1815499"/>
-              <a:gd name="connsiteX5" fmla="*/ 3075304 w 6685443"/>
-              <a:gd name="connsiteY5" fmla="*/ 0 h 1815499"/>
-              <a:gd name="connsiteX6" fmla="*/ 3877557 w 6685443"/>
-              <a:gd name="connsiteY6" fmla="*/ 0 h 1815499"/>
-              <a:gd name="connsiteX7" fmla="*/ 4412392 w 6685443"/>
-              <a:gd name="connsiteY7" fmla="*/ 0 h 1815499"/>
-              <a:gd name="connsiteX8" fmla="*/ 5214646 w 6685443"/>
-              <a:gd name="connsiteY8" fmla="*/ 0 h 1815499"/>
-              <a:gd name="connsiteX9" fmla="*/ 6016899 w 6685443"/>
-              <a:gd name="connsiteY9" fmla="*/ 0 h 1815499"/>
-              <a:gd name="connsiteX10" fmla="*/ 6685443 w 6685443"/>
-              <a:gd name="connsiteY10" fmla="*/ 0 h 1815499"/>
-              <a:gd name="connsiteX11" fmla="*/ 6685443 w 6685443"/>
-              <a:gd name="connsiteY11" fmla="*/ 641476 h 1815499"/>
-              <a:gd name="connsiteX12" fmla="*/ 6685443 w 6685443"/>
-              <a:gd name="connsiteY12" fmla="*/ 1264798 h 1815499"/>
-              <a:gd name="connsiteX13" fmla="*/ 6685443 w 6685443"/>
-              <a:gd name="connsiteY13" fmla="*/ 1815499 h 1815499"/>
-              <a:gd name="connsiteX14" fmla="*/ 6016899 w 6685443"/>
-              <a:gd name="connsiteY14" fmla="*/ 1815499 h 1815499"/>
-              <a:gd name="connsiteX15" fmla="*/ 5482063 w 6685443"/>
-              <a:gd name="connsiteY15" fmla="*/ 1815499 h 1815499"/>
-              <a:gd name="connsiteX16" fmla="*/ 4813519 w 6685443"/>
-              <a:gd name="connsiteY16" fmla="*/ 1815499 h 1815499"/>
-              <a:gd name="connsiteX17" fmla="*/ 4011266 w 6685443"/>
-              <a:gd name="connsiteY17" fmla="*/ 1815499 h 1815499"/>
-              <a:gd name="connsiteX18" fmla="*/ 3342722 w 6685443"/>
-              <a:gd name="connsiteY18" fmla="*/ 1815499 h 1815499"/>
-              <a:gd name="connsiteX19" fmla="*/ 2874740 w 6685443"/>
-              <a:gd name="connsiteY19" fmla="*/ 1815499 h 1815499"/>
-              <a:gd name="connsiteX20" fmla="*/ 2339905 w 6685443"/>
-              <a:gd name="connsiteY20" fmla="*/ 1815499 h 1815499"/>
-              <a:gd name="connsiteX21" fmla="*/ 1537652 w 6685443"/>
-              <a:gd name="connsiteY21" fmla="*/ 1815499 h 1815499"/>
-              <a:gd name="connsiteX22" fmla="*/ 869108 w 6685443"/>
-              <a:gd name="connsiteY22" fmla="*/ 1815499 h 1815499"/>
-              <a:gd name="connsiteX23" fmla="*/ 0 w 6685443"/>
-              <a:gd name="connsiteY23" fmla="*/ 1815499 h 1815499"/>
-              <a:gd name="connsiteX24" fmla="*/ 0 w 6685443"/>
-              <a:gd name="connsiteY24" fmla="*/ 1210333 h 1815499"/>
-              <a:gd name="connsiteX25" fmla="*/ 0 w 6685443"/>
-              <a:gd name="connsiteY25" fmla="*/ 659631 h 1815499"/>
-              <a:gd name="connsiteX26" fmla="*/ 0 w 6685443"/>
-              <a:gd name="connsiteY26" fmla="*/ 0 h 1815499"/>
+              <a:gd name="connsiteX0" fmla="*/ 0 w 3984158"/>
+              <a:gd name="connsiteY0" fmla="*/ 0 h 1483208"/>
+              <a:gd name="connsiteX1" fmla="*/ 624185 w 3984158"/>
+              <a:gd name="connsiteY1" fmla="*/ 0 h 1483208"/>
+              <a:gd name="connsiteX2" fmla="*/ 1168686 w 3984158"/>
+              <a:gd name="connsiteY2" fmla="*/ 0 h 1483208"/>
+              <a:gd name="connsiteX3" fmla="*/ 1912396 w 3984158"/>
+              <a:gd name="connsiteY3" fmla="*/ 0 h 1483208"/>
+              <a:gd name="connsiteX4" fmla="*/ 2536581 w 3984158"/>
+              <a:gd name="connsiteY4" fmla="*/ 0 h 1483208"/>
+              <a:gd name="connsiteX5" fmla="*/ 3160765 w 3984158"/>
+              <a:gd name="connsiteY5" fmla="*/ 0 h 1483208"/>
+              <a:gd name="connsiteX6" fmla="*/ 3984158 w 3984158"/>
+              <a:gd name="connsiteY6" fmla="*/ 0 h 1483208"/>
+              <a:gd name="connsiteX7" fmla="*/ 3984158 w 3984158"/>
+              <a:gd name="connsiteY7" fmla="*/ 464739 h 1483208"/>
+              <a:gd name="connsiteX8" fmla="*/ 3984158 w 3984158"/>
+              <a:gd name="connsiteY8" fmla="*/ 959141 h 1483208"/>
+              <a:gd name="connsiteX9" fmla="*/ 3984158 w 3984158"/>
+              <a:gd name="connsiteY9" fmla="*/ 1483208 h 1483208"/>
+              <a:gd name="connsiteX10" fmla="*/ 3399815 w 3984158"/>
+              <a:gd name="connsiteY10" fmla="*/ 1483208 h 1483208"/>
+              <a:gd name="connsiteX11" fmla="*/ 2735788 w 3984158"/>
+              <a:gd name="connsiteY11" fmla="*/ 1483208 h 1483208"/>
+              <a:gd name="connsiteX12" fmla="*/ 2111604 w 3984158"/>
+              <a:gd name="connsiteY12" fmla="*/ 1483208 h 1483208"/>
+              <a:gd name="connsiteX13" fmla="*/ 1367894 w 3984158"/>
+              <a:gd name="connsiteY13" fmla="*/ 1483208 h 1483208"/>
+              <a:gd name="connsiteX14" fmla="*/ 624185 w 3984158"/>
+              <a:gd name="connsiteY14" fmla="*/ 1483208 h 1483208"/>
+              <a:gd name="connsiteX15" fmla="*/ 0 w 3984158"/>
+              <a:gd name="connsiteY15" fmla="*/ 1483208 h 1483208"/>
+              <a:gd name="connsiteX16" fmla="*/ 0 w 3984158"/>
+              <a:gd name="connsiteY16" fmla="*/ 988805 h 1483208"/>
+              <a:gd name="connsiteX17" fmla="*/ 0 w 3984158"/>
+              <a:gd name="connsiteY17" fmla="*/ 509235 h 1483208"/>
+              <a:gd name="connsiteX18" fmla="*/ 0 w 3984158"/>
+              <a:gd name="connsiteY18" fmla="*/ 0 h 1483208"/>
             </a:gdLst>
             <a:ahLst/>
             <a:cxnLst>
@@ -10649,165 +10659,101 @@
               <a:cxn ang="0">
                 <a:pos x="connsiteX18" y="connsiteY18"/>
               </a:cxn>
-              <a:cxn ang="0">
-                <a:pos x="connsiteX19" y="connsiteY19"/>
-              </a:cxn>
-              <a:cxn ang="0">
-                <a:pos x="connsiteX20" y="connsiteY20"/>
-              </a:cxn>
-              <a:cxn ang="0">
-                <a:pos x="connsiteX21" y="connsiteY21"/>
-              </a:cxn>
-              <a:cxn ang="0">
-                <a:pos x="connsiteX22" y="connsiteY22"/>
-              </a:cxn>
-              <a:cxn ang="0">
-                <a:pos x="connsiteX23" y="connsiteY23"/>
-              </a:cxn>
-              <a:cxn ang="0">
-                <a:pos x="connsiteX24" y="connsiteY24"/>
-              </a:cxn>
-              <a:cxn ang="0">
-                <a:pos x="connsiteX25" y="connsiteY25"/>
-              </a:cxn>
-              <a:cxn ang="0">
-                <a:pos x="connsiteX26" y="connsiteY26"/>
-              </a:cxn>
             </a:cxnLst>
             <a:rect l="l" t="t" r="r" b="b"/>
             <a:pathLst>
-              <a:path w="6685443" h="1815499" extrusionOk="0">
+              <a:path w="3984158" h="1483208" extrusionOk="0">
                 <a:moveTo>
                   <a:pt x="0" y="0"/>
                 </a:moveTo>
                 <a:cubicBezTo>
-                  <a:pt x="197687" y="5421"/>
-                  <a:pt x="392637" y="-27165"/>
-                  <a:pt x="601690" y="0"/>
-                </a:cubicBezTo>
-                <a:cubicBezTo>
-                  <a:pt x="810743" y="27165"/>
-                  <a:pt x="967174" y="20034"/>
-                  <a:pt x="1069671" y="0"/>
-                </a:cubicBezTo>
-                <a:cubicBezTo>
-                  <a:pt x="1172168" y="-20034"/>
-                  <a:pt x="1481114" y="26288"/>
-                  <a:pt x="1871924" y="0"/>
-                </a:cubicBezTo>
-                <a:cubicBezTo>
-                  <a:pt x="2262734" y="-26288"/>
-                  <a:pt x="2275646" y="9816"/>
-                  <a:pt x="2473614" y="0"/>
-                </a:cubicBezTo>
-                <a:cubicBezTo>
-                  <a:pt x="2671582" y="-9816"/>
-                  <a:pt x="2837715" y="-16866"/>
-                  <a:pt x="3075304" y="0"/>
-                </a:cubicBezTo>
-                <a:cubicBezTo>
-                  <a:pt x="3312893" y="16866"/>
-                  <a:pt x="3565082" y="13656"/>
-                  <a:pt x="3877557" y="0"/>
-                </a:cubicBezTo>
-                <a:cubicBezTo>
-                  <a:pt x="4190032" y="-13656"/>
-                  <a:pt x="4275680" y="23045"/>
-                  <a:pt x="4412392" y="0"/>
-                </a:cubicBezTo>
-                <a:cubicBezTo>
-                  <a:pt x="4549105" y="-23045"/>
-                  <a:pt x="4974381" y="13533"/>
-                  <a:pt x="5214646" y="0"/>
-                </a:cubicBezTo>
-                <a:cubicBezTo>
-                  <a:pt x="5454911" y="-13533"/>
-                  <a:pt x="5621382" y="6072"/>
-                  <a:pt x="6016899" y="0"/>
-                </a:cubicBezTo>
-                <a:cubicBezTo>
-                  <a:pt x="6412416" y="-6072"/>
-                  <a:pt x="6368099" y="-22480"/>
-                  <a:pt x="6685443" y="0"/>
-                </a:cubicBezTo>
-                <a:cubicBezTo>
-                  <a:pt x="6675060" y="141143"/>
-                  <a:pt x="6688790" y="422707"/>
-                  <a:pt x="6685443" y="641476"/>
-                </a:cubicBezTo>
-                <a:cubicBezTo>
-                  <a:pt x="6682096" y="860245"/>
-                  <a:pt x="6676921" y="1110529"/>
-                  <a:pt x="6685443" y="1264798"/>
-                </a:cubicBezTo>
-                <a:cubicBezTo>
-                  <a:pt x="6693965" y="1419067"/>
-                  <a:pt x="6712438" y="1626237"/>
-                  <a:pt x="6685443" y="1815499"/>
-                </a:cubicBezTo>
-                <a:cubicBezTo>
-                  <a:pt x="6531485" y="1826631"/>
-                  <a:pt x="6258288" y="1826162"/>
-                  <a:pt x="6016899" y="1815499"/>
-                </a:cubicBezTo>
-                <a:cubicBezTo>
-                  <a:pt x="5775510" y="1804836"/>
-                  <a:pt x="5635687" y="1808580"/>
-                  <a:pt x="5482063" y="1815499"/>
-                </a:cubicBezTo>
-                <a:cubicBezTo>
-                  <a:pt x="5328439" y="1822418"/>
-                  <a:pt x="4969533" y="1798322"/>
-                  <a:pt x="4813519" y="1815499"/>
-                </a:cubicBezTo>
-                <a:cubicBezTo>
-                  <a:pt x="4657505" y="1832676"/>
-                  <a:pt x="4277484" y="1797792"/>
-                  <a:pt x="4011266" y="1815499"/>
-                </a:cubicBezTo>
-                <a:cubicBezTo>
-                  <a:pt x="3745048" y="1833206"/>
-                  <a:pt x="3503887" y="1798854"/>
-                  <a:pt x="3342722" y="1815499"/>
-                </a:cubicBezTo>
-                <a:cubicBezTo>
-                  <a:pt x="3181557" y="1832144"/>
-                  <a:pt x="3094655" y="1808958"/>
-                  <a:pt x="2874740" y="1815499"/>
-                </a:cubicBezTo>
-                <a:cubicBezTo>
-                  <a:pt x="2654825" y="1822040"/>
-                  <a:pt x="2552356" y="1810430"/>
-                  <a:pt x="2339905" y="1815499"/>
-                </a:cubicBezTo>
-                <a:cubicBezTo>
-                  <a:pt x="2127454" y="1820568"/>
-                  <a:pt x="1825409" y="1807327"/>
-                  <a:pt x="1537652" y="1815499"/>
-                </a:cubicBezTo>
-                <a:cubicBezTo>
-                  <a:pt x="1249895" y="1823671"/>
-                  <a:pt x="1086879" y="1834794"/>
-                  <a:pt x="869108" y="1815499"/>
-                </a:cubicBezTo>
-                <a:cubicBezTo>
-                  <a:pt x="651337" y="1796204"/>
-                  <a:pt x="264417" y="1828267"/>
-                  <a:pt x="0" y="1815499"/>
-                </a:cubicBezTo>
-                <a:cubicBezTo>
-                  <a:pt x="8313" y="1520428"/>
-                  <a:pt x="-1936" y="1449694"/>
-                  <a:pt x="0" y="1210333"/>
-                </a:cubicBezTo>
-                <a:cubicBezTo>
-                  <a:pt x="1936" y="970972"/>
-                  <a:pt x="16209" y="905402"/>
-                  <a:pt x="0" y="659631"/>
-                </a:cubicBezTo>
-                <a:cubicBezTo>
-                  <a:pt x="-16209" y="413860"/>
-                  <a:pt x="-15680" y="309233"/>
+                  <a:pt x="183423" y="18876"/>
+                  <a:pt x="387432" y="11885"/>
+                  <a:pt x="624185" y="0"/>
+                </a:cubicBezTo>
+                <a:cubicBezTo>
+                  <a:pt x="860939" y="-11885"/>
+                  <a:pt x="1054606" y="-18463"/>
+                  <a:pt x="1168686" y="0"/>
+                </a:cubicBezTo>
+                <a:cubicBezTo>
+                  <a:pt x="1282766" y="18463"/>
+                  <a:pt x="1693901" y="35828"/>
+                  <a:pt x="1912396" y="0"/>
+                </a:cubicBezTo>
+                <a:cubicBezTo>
+                  <a:pt x="2130891" y="-35828"/>
+                  <a:pt x="2399161" y="-14960"/>
+                  <a:pt x="2536581" y="0"/>
+                </a:cubicBezTo>
+                <a:cubicBezTo>
+                  <a:pt x="2674002" y="14960"/>
+                  <a:pt x="2930878" y="25357"/>
+                  <a:pt x="3160765" y="0"/>
+                </a:cubicBezTo>
+                <a:cubicBezTo>
+                  <a:pt x="3390652" y="-25357"/>
+                  <a:pt x="3618233" y="22549"/>
+                  <a:pt x="3984158" y="0"/>
+                </a:cubicBezTo>
+                <a:cubicBezTo>
+                  <a:pt x="3984038" y="195374"/>
+                  <a:pt x="3982039" y="245726"/>
+                  <a:pt x="3984158" y="464739"/>
+                </a:cubicBezTo>
+                <a:cubicBezTo>
+                  <a:pt x="3986277" y="683752"/>
+                  <a:pt x="3968175" y="738445"/>
+                  <a:pt x="3984158" y="959141"/>
+                </a:cubicBezTo>
+                <a:cubicBezTo>
+                  <a:pt x="4000141" y="1179837"/>
+                  <a:pt x="4006929" y="1289598"/>
+                  <a:pt x="3984158" y="1483208"/>
+                </a:cubicBezTo>
+                <a:cubicBezTo>
+                  <a:pt x="3803422" y="1507410"/>
+                  <a:pt x="3621945" y="1507539"/>
+                  <a:pt x="3399815" y="1483208"/>
+                </a:cubicBezTo>
+                <a:cubicBezTo>
+                  <a:pt x="3177685" y="1458877"/>
+                  <a:pt x="2949391" y="1453742"/>
+                  <a:pt x="2735788" y="1483208"/>
+                </a:cubicBezTo>
+                <a:cubicBezTo>
+                  <a:pt x="2522185" y="1512674"/>
+                  <a:pt x="2346462" y="1470132"/>
+                  <a:pt x="2111604" y="1483208"/>
+                </a:cubicBezTo>
+                <a:cubicBezTo>
+                  <a:pt x="1876746" y="1496284"/>
+                  <a:pt x="1574870" y="1492723"/>
+                  <a:pt x="1367894" y="1483208"/>
+                </a:cubicBezTo>
+                <a:cubicBezTo>
+                  <a:pt x="1160918" y="1473694"/>
+                  <a:pt x="788357" y="1457438"/>
+                  <a:pt x="624185" y="1483208"/>
+                </a:cubicBezTo>
+                <a:cubicBezTo>
+                  <a:pt x="460013" y="1508978"/>
+                  <a:pt x="282889" y="1481339"/>
+                  <a:pt x="0" y="1483208"/>
+                </a:cubicBezTo>
+                <a:cubicBezTo>
+                  <a:pt x="24368" y="1316907"/>
+                  <a:pt x="-24567" y="1129752"/>
+                  <a:pt x="0" y="988805"/>
+                </a:cubicBezTo>
+                <a:cubicBezTo>
+                  <a:pt x="24567" y="847858"/>
+                  <a:pt x="2696" y="683175"/>
+                  <a:pt x="0" y="509235"/>
+                </a:cubicBezTo>
+                <a:cubicBezTo>
+                  <a:pt x="-2696" y="335295"/>
+                  <a:pt x="22160" y="109840"/>
                   <a:pt x="0" y="0"/>
                 </a:cubicBezTo>
                 <a:close/>
@@ -11051,6 +10997,44 @@
               <a:rPr lang="en-US" dirty="0"/>
               <a:t>./hello-world</a:t>
             </a:r>
+          </a:p>
+        </p:txBody>
+      </p:sp>
+      <p:sp>
+        <p:nvSpPr>
+          <p:cNvPr id="3" name="TextBox 2">
+            <a:extLst>
+              <a:ext uri="{FF2B5EF4-FFF2-40B4-BE49-F238E27FC236}">
+                <a16:creationId xmlns:a16="http://schemas.microsoft.com/office/drawing/2014/main" id="{D4B81D6B-CB52-2587-E0AA-D4640619FFF1}"/>
+              </a:ext>
+            </a:extLst>
+          </p:cNvPr>
+          <p:cNvSpPr txBox="1"/>
+          <p:nvPr/>
+        </p:nvSpPr>
+        <p:spPr>
+          <a:xfrm>
+            <a:off x="156485" y="224498"/>
+            <a:ext cx="4829319" cy="369332"/>
+          </a:xfrm>
+          <a:prstGeom prst="rect">
+            <a:avLst/>
+          </a:prstGeom>
+          <a:noFill/>
+        </p:spPr>
+        <p:txBody>
+          <a:bodyPr wrap="square">
+            <a:spAutoFit/>
+          </a:bodyPr>
+          <a:lstStyle/>
+          <a:p>
+            <a:r>
+              <a:rPr lang="en-US" dirty="0">
+                <a:latin typeface="Gaegu" pitchFamily="2" charset="0"/>
+              </a:rPr>
+              <a:t>Program Execution and Sequence</a:t>
+            </a:r>
+            <a:endParaRPr lang="en-US" b="1" dirty="0"/>
           </a:p>
         </p:txBody>
       </p:sp>
@@ -12481,7 +12465,13 @@
               <a:buAutoNum type="arabicPeriod"/>
             </a:pPr>
             <a:r>
-              <a:rPr lang="en-US" dirty="0"/>
+              <a:rPr lang="en-US" dirty="0">
+                <a:solidFill>
+                  <a:schemeClr val="bg1">
+                    <a:lumMod val="65000"/>
+                  </a:schemeClr>
+                </a:solidFill>
+              </a:rPr>
               <a:t>0010</a:t>
             </a:r>
           </a:p>
@@ -12491,7 +12481,13 @@
               <a:buAutoNum type="arabicPeriod"/>
             </a:pPr>
             <a:r>
-              <a:rPr lang="en-US" dirty="0"/>
+              <a:rPr lang="en-US" dirty="0">
+                <a:solidFill>
+                  <a:schemeClr val="bg1">
+                    <a:lumMod val="65000"/>
+                  </a:schemeClr>
+                </a:solidFill>
+              </a:rPr>
               <a:t>1010</a:t>
             </a:r>
           </a:p>
@@ -12501,7 +12497,13 @@
               <a:buAutoNum type="arabicPeriod"/>
             </a:pPr>
             <a:r>
-              <a:rPr lang="en-US" dirty="0"/>
+              <a:rPr lang="en-US" dirty="0">
+                <a:solidFill>
+                  <a:schemeClr val="bg1">
+                    <a:lumMod val="65000"/>
+                  </a:schemeClr>
+                </a:solidFill>
+              </a:rPr>
               <a:t>1101</a:t>
             </a:r>
           </a:p>
@@ -12511,7 +12513,13 @@
               <a:buAutoNum type="arabicPeriod"/>
             </a:pPr>
             <a:r>
-              <a:rPr lang="en-US" dirty="0"/>
+              <a:rPr lang="en-US" dirty="0">
+                <a:solidFill>
+                  <a:schemeClr val="bg1">
+                    <a:lumMod val="65000"/>
+                  </a:schemeClr>
+                </a:solidFill>
+              </a:rPr>
               <a:t>1111</a:t>
             </a:r>
           </a:p>
@@ -12521,7 +12529,13 @@
               <a:buAutoNum type="arabicPeriod"/>
             </a:pPr>
             <a:r>
-              <a:rPr lang="en-US" dirty="0"/>
+              <a:rPr lang="en-US" dirty="0">
+                <a:solidFill>
+                  <a:schemeClr val="bg1">
+                    <a:lumMod val="65000"/>
+                  </a:schemeClr>
+                </a:solidFill>
+              </a:rPr>
               <a:t>1001</a:t>
             </a:r>
           </a:p>
@@ -13149,60 +13163,44 @@
           <a:custGeom>
             <a:avLst/>
             <a:gdLst>
-              <a:gd name="connsiteX0" fmla="*/ 0 w 6685443"/>
-              <a:gd name="connsiteY0" fmla="*/ 0 h 1815499"/>
-              <a:gd name="connsiteX1" fmla="*/ 601690 w 6685443"/>
-              <a:gd name="connsiteY1" fmla="*/ 0 h 1815499"/>
-              <a:gd name="connsiteX2" fmla="*/ 1069671 w 6685443"/>
-              <a:gd name="connsiteY2" fmla="*/ 0 h 1815499"/>
-              <a:gd name="connsiteX3" fmla="*/ 1871924 w 6685443"/>
-              <a:gd name="connsiteY3" fmla="*/ 0 h 1815499"/>
-              <a:gd name="connsiteX4" fmla="*/ 2473614 w 6685443"/>
-              <a:gd name="connsiteY4" fmla="*/ 0 h 1815499"/>
-              <a:gd name="connsiteX5" fmla="*/ 3075304 w 6685443"/>
-              <a:gd name="connsiteY5" fmla="*/ 0 h 1815499"/>
-              <a:gd name="connsiteX6" fmla="*/ 3877557 w 6685443"/>
-              <a:gd name="connsiteY6" fmla="*/ 0 h 1815499"/>
-              <a:gd name="connsiteX7" fmla="*/ 4412392 w 6685443"/>
-              <a:gd name="connsiteY7" fmla="*/ 0 h 1815499"/>
-              <a:gd name="connsiteX8" fmla="*/ 5214646 w 6685443"/>
-              <a:gd name="connsiteY8" fmla="*/ 0 h 1815499"/>
-              <a:gd name="connsiteX9" fmla="*/ 6016899 w 6685443"/>
-              <a:gd name="connsiteY9" fmla="*/ 0 h 1815499"/>
-              <a:gd name="connsiteX10" fmla="*/ 6685443 w 6685443"/>
-              <a:gd name="connsiteY10" fmla="*/ 0 h 1815499"/>
-              <a:gd name="connsiteX11" fmla="*/ 6685443 w 6685443"/>
-              <a:gd name="connsiteY11" fmla="*/ 641476 h 1815499"/>
-              <a:gd name="connsiteX12" fmla="*/ 6685443 w 6685443"/>
-              <a:gd name="connsiteY12" fmla="*/ 1264798 h 1815499"/>
-              <a:gd name="connsiteX13" fmla="*/ 6685443 w 6685443"/>
-              <a:gd name="connsiteY13" fmla="*/ 1815499 h 1815499"/>
-              <a:gd name="connsiteX14" fmla="*/ 6016899 w 6685443"/>
-              <a:gd name="connsiteY14" fmla="*/ 1815499 h 1815499"/>
-              <a:gd name="connsiteX15" fmla="*/ 5482063 w 6685443"/>
-              <a:gd name="connsiteY15" fmla="*/ 1815499 h 1815499"/>
-              <a:gd name="connsiteX16" fmla="*/ 4813519 w 6685443"/>
-              <a:gd name="connsiteY16" fmla="*/ 1815499 h 1815499"/>
-              <a:gd name="connsiteX17" fmla="*/ 4011266 w 6685443"/>
-              <a:gd name="connsiteY17" fmla="*/ 1815499 h 1815499"/>
-              <a:gd name="connsiteX18" fmla="*/ 3342722 w 6685443"/>
-              <a:gd name="connsiteY18" fmla="*/ 1815499 h 1815499"/>
-              <a:gd name="connsiteX19" fmla="*/ 2874740 w 6685443"/>
-              <a:gd name="connsiteY19" fmla="*/ 1815499 h 1815499"/>
-              <a:gd name="connsiteX20" fmla="*/ 2339905 w 6685443"/>
-              <a:gd name="connsiteY20" fmla="*/ 1815499 h 1815499"/>
-              <a:gd name="connsiteX21" fmla="*/ 1537652 w 6685443"/>
-              <a:gd name="connsiteY21" fmla="*/ 1815499 h 1815499"/>
-              <a:gd name="connsiteX22" fmla="*/ 869108 w 6685443"/>
-              <a:gd name="connsiteY22" fmla="*/ 1815499 h 1815499"/>
-              <a:gd name="connsiteX23" fmla="*/ 0 w 6685443"/>
-              <a:gd name="connsiteY23" fmla="*/ 1815499 h 1815499"/>
-              <a:gd name="connsiteX24" fmla="*/ 0 w 6685443"/>
-              <a:gd name="connsiteY24" fmla="*/ 1210333 h 1815499"/>
-              <a:gd name="connsiteX25" fmla="*/ 0 w 6685443"/>
-              <a:gd name="connsiteY25" fmla="*/ 659631 h 1815499"/>
-              <a:gd name="connsiteX26" fmla="*/ 0 w 6685443"/>
-              <a:gd name="connsiteY26" fmla="*/ 0 h 1815499"/>
+              <a:gd name="connsiteX0" fmla="*/ 0 w 3984158"/>
+              <a:gd name="connsiteY0" fmla="*/ 0 h 1483208"/>
+              <a:gd name="connsiteX1" fmla="*/ 624185 w 3984158"/>
+              <a:gd name="connsiteY1" fmla="*/ 0 h 1483208"/>
+              <a:gd name="connsiteX2" fmla="*/ 1168686 w 3984158"/>
+              <a:gd name="connsiteY2" fmla="*/ 0 h 1483208"/>
+              <a:gd name="connsiteX3" fmla="*/ 1912396 w 3984158"/>
+              <a:gd name="connsiteY3" fmla="*/ 0 h 1483208"/>
+              <a:gd name="connsiteX4" fmla="*/ 2536581 w 3984158"/>
+              <a:gd name="connsiteY4" fmla="*/ 0 h 1483208"/>
+              <a:gd name="connsiteX5" fmla="*/ 3160765 w 3984158"/>
+              <a:gd name="connsiteY5" fmla="*/ 0 h 1483208"/>
+              <a:gd name="connsiteX6" fmla="*/ 3984158 w 3984158"/>
+              <a:gd name="connsiteY6" fmla="*/ 0 h 1483208"/>
+              <a:gd name="connsiteX7" fmla="*/ 3984158 w 3984158"/>
+              <a:gd name="connsiteY7" fmla="*/ 464739 h 1483208"/>
+              <a:gd name="connsiteX8" fmla="*/ 3984158 w 3984158"/>
+              <a:gd name="connsiteY8" fmla="*/ 959141 h 1483208"/>
+              <a:gd name="connsiteX9" fmla="*/ 3984158 w 3984158"/>
+              <a:gd name="connsiteY9" fmla="*/ 1483208 h 1483208"/>
+              <a:gd name="connsiteX10" fmla="*/ 3399815 w 3984158"/>
+              <a:gd name="connsiteY10" fmla="*/ 1483208 h 1483208"/>
+              <a:gd name="connsiteX11" fmla="*/ 2735788 w 3984158"/>
+              <a:gd name="connsiteY11" fmla="*/ 1483208 h 1483208"/>
+              <a:gd name="connsiteX12" fmla="*/ 2111604 w 3984158"/>
+              <a:gd name="connsiteY12" fmla="*/ 1483208 h 1483208"/>
+              <a:gd name="connsiteX13" fmla="*/ 1367894 w 3984158"/>
+              <a:gd name="connsiteY13" fmla="*/ 1483208 h 1483208"/>
+              <a:gd name="connsiteX14" fmla="*/ 624185 w 3984158"/>
+              <a:gd name="connsiteY14" fmla="*/ 1483208 h 1483208"/>
+              <a:gd name="connsiteX15" fmla="*/ 0 w 3984158"/>
+              <a:gd name="connsiteY15" fmla="*/ 1483208 h 1483208"/>
+              <a:gd name="connsiteX16" fmla="*/ 0 w 3984158"/>
+              <a:gd name="connsiteY16" fmla="*/ 988805 h 1483208"/>
+              <a:gd name="connsiteX17" fmla="*/ 0 w 3984158"/>
+              <a:gd name="connsiteY17" fmla="*/ 509235 h 1483208"/>
+              <a:gd name="connsiteX18" fmla="*/ 0 w 3984158"/>
+              <a:gd name="connsiteY18" fmla="*/ 0 h 1483208"/>
             </a:gdLst>
             <a:ahLst/>
             <a:cxnLst>
@@ -13263,165 +13261,101 @@
               <a:cxn ang="0">
                 <a:pos x="connsiteX18" y="connsiteY18"/>
               </a:cxn>
-              <a:cxn ang="0">
-                <a:pos x="connsiteX19" y="connsiteY19"/>
-              </a:cxn>
-              <a:cxn ang="0">
-                <a:pos x="connsiteX20" y="connsiteY20"/>
-              </a:cxn>
-              <a:cxn ang="0">
-                <a:pos x="connsiteX21" y="connsiteY21"/>
-              </a:cxn>
-              <a:cxn ang="0">
-                <a:pos x="connsiteX22" y="connsiteY22"/>
-              </a:cxn>
-              <a:cxn ang="0">
-                <a:pos x="connsiteX23" y="connsiteY23"/>
-              </a:cxn>
-              <a:cxn ang="0">
-                <a:pos x="connsiteX24" y="connsiteY24"/>
-              </a:cxn>
-              <a:cxn ang="0">
-                <a:pos x="connsiteX25" y="connsiteY25"/>
-              </a:cxn>
-              <a:cxn ang="0">
-                <a:pos x="connsiteX26" y="connsiteY26"/>
-              </a:cxn>
             </a:cxnLst>
             <a:rect l="l" t="t" r="r" b="b"/>
             <a:pathLst>
-              <a:path w="6685443" h="1815499" extrusionOk="0">
+              <a:path w="3984158" h="1483208" extrusionOk="0">
                 <a:moveTo>
                   <a:pt x="0" y="0"/>
                 </a:moveTo>
                 <a:cubicBezTo>
-                  <a:pt x="197687" y="5421"/>
-                  <a:pt x="392637" y="-27165"/>
-                  <a:pt x="601690" y="0"/>
-                </a:cubicBezTo>
-                <a:cubicBezTo>
-                  <a:pt x="810743" y="27165"/>
-                  <a:pt x="967174" y="20034"/>
-                  <a:pt x="1069671" y="0"/>
-                </a:cubicBezTo>
-                <a:cubicBezTo>
-                  <a:pt x="1172168" y="-20034"/>
-                  <a:pt x="1481114" y="26288"/>
-                  <a:pt x="1871924" y="0"/>
-                </a:cubicBezTo>
-                <a:cubicBezTo>
-                  <a:pt x="2262734" y="-26288"/>
-                  <a:pt x="2275646" y="9816"/>
-                  <a:pt x="2473614" y="0"/>
-                </a:cubicBezTo>
-                <a:cubicBezTo>
-                  <a:pt x="2671582" y="-9816"/>
-                  <a:pt x="2837715" y="-16866"/>
-                  <a:pt x="3075304" y="0"/>
-                </a:cubicBezTo>
-                <a:cubicBezTo>
-                  <a:pt x="3312893" y="16866"/>
-                  <a:pt x="3565082" y="13656"/>
-                  <a:pt x="3877557" y="0"/>
-                </a:cubicBezTo>
-                <a:cubicBezTo>
-                  <a:pt x="4190032" y="-13656"/>
-                  <a:pt x="4275680" y="23045"/>
-                  <a:pt x="4412392" y="0"/>
-                </a:cubicBezTo>
-                <a:cubicBezTo>
-                  <a:pt x="4549105" y="-23045"/>
-                  <a:pt x="4974381" y="13533"/>
-                  <a:pt x="5214646" y="0"/>
-                </a:cubicBezTo>
-                <a:cubicBezTo>
-                  <a:pt x="5454911" y="-13533"/>
-                  <a:pt x="5621382" y="6072"/>
-                  <a:pt x="6016899" y="0"/>
-                </a:cubicBezTo>
-                <a:cubicBezTo>
-                  <a:pt x="6412416" y="-6072"/>
-                  <a:pt x="6368099" y="-22480"/>
-                  <a:pt x="6685443" y="0"/>
-                </a:cubicBezTo>
-                <a:cubicBezTo>
-                  <a:pt x="6675060" y="141143"/>
-                  <a:pt x="6688790" y="422707"/>
-                  <a:pt x="6685443" y="641476"/>
-                </a:cubicBezTo>
-                <a:cubicBezTo>
-                  <a:pt x="6682096" y="860245"/>
-                  <a:pt x="6676921" y="1110529"/>
-                  <a:pt x="6685443" y="1264798"/>
-                </a:cubicBezTo>
-                <a:cubicBezTo>
-                  <a:pt x="6693965" y="1419067"/>
-                  <a:pt x="6712438" y="1626237"/>
-                  <a:pt x="6685443" y="1815499"/>
-                </a:cubicBezTo>
-                <a:cubicBezTo>
-                  <a:pt x="6531485" y="1826631"/>
-                  <a:pt x="6258288" y="1826162"/>
-                  <a:pt x="6016899" y="1815499"/>
-                </a:cubicBezTo>
-                <a:cubicBezTo>
-                  <a:pt x="5775510" y="1804836"/>
-                  <a:pt x="5635687" y="1808580"/>
-                  <a:pt x="5482063" y="1815499"/>
-                </a:cubicBezTo>
-                <a:cubicBezTo>
-                  <a:pt x="5328439" y="1822418"/>
-                  <a:pt x="4969533" y="1798322"/>
-                  <a:pt x="4813519" y="1815499"/>
-                </a:cubicBezTo>
-                <a:cubicBezTo>
-                  <a:pt x="4657505" y="1832676"/>
-                  <a:pt x="4277484" y="1797792"/>
-                  <a:pt x="4011266" y="1815499"/>
-                </a:cubicBezTo>
-                <a:cubicBezTo>
-                  <a:pt x="3745048" y="1833206"/>
-                  <a:pt x="3503887" y="1798854"/>
-                  <a:pt x="3342722" y="1815499"/>
-                </a:cubicBezTo>
-                <a:cubicBezTo>
-                  <a:pt x="3181557" y="1832144"/>
-                  <a:pt x="3094655" y="1808958"/>
-                  <a:pt x="2874740" y="1815499"/>
-                </a:cubicBezTo>
-                <a:cubicBezTo>
-                  <a:pt x="2654825" y="1822040"/>
-                  <a:pt x="2552356" y="1810430"/>
-                  <a:pt x="2339905" y="1815499"/>
-                </a:cubicBezTo>
-                <a:cubicBezTo>
-                  <a:pt x="2127454" y="1820568"/>
-                  <a:pt x="1825409" y="1807327"/>
-                  <a:pt x="1537652" y="1815499"/>
-                </a:cubicBezTo>
-                <a:cubicBezTo>
-                  <a:pt x="1249895" y="1823671"/>
-                  <a:pt x="1086879" y="1834794"/>
-                  <a:pt x="869108" y="1815499"/>
-                </a:cubicBezTo>
-                <a:cubicBezTo>
-                  <a:pt x="651337" y="1796204"/>
-                  <a:pt x="264417" y="1828267"/>
-                  <a:pt x="0" y="1815499"/>
-                </a:cubicBezTo>
-                <a:cubicBezTo>
-                  <a:pt x="8313" y="1520428"/>
-                  <a:pt x="-1936" y="1449694"/>
-                  <a:pt x="0" y="1210333"/>
-                </a:cubicBezTo>
-                <a:cubicBezTo>
-                  <a:pt x="1936" y="970972"/>
-                  <a:pt x="16209" y="905402"/>
-                  <a:pt x="0" y="659631"/>
-                </a:cubicBezTo>
-                <a:cubicBezTo>
-                  <a:pt x="-16209" y="413860"/>
-                  <a:pt x="-15680" y="309233"/>
+                  <a:pt x="183423" y="18876"/>
+                  <a:pt x="387432" y="11885"/>
+                  <a:pt x="624185" y="0"/>
+                </a:cubicBezTo>
+                <a:cubicBezTo>
+                  <a:pt x="860939" y="-11885"/>
+                  <a:pt x="1054606" y="-18463"/>
+                  <a:pt x="1168686" y="0"/>
+                </a:cubicBezTo>
+                <a:cubicBezTo>
+                  <a:pt x="1282766" y="18463"/>
+                  <a:pt x="1693901" y="35828"/>
+                  <a:pt x="1912396" y="0"/>
+                </a:cubicBezTo>
+                <a:cubicBezTo>
+                  <a:pt x="2130891" y="-35828"/>
+                  <a:pt x="2399161" y="-14960"/>
+                  <a:pt x="2536581" y="0"/>
+                </a:cubicBezTo>
+                <a:cubicBezTo>
+                  <a:pt x="2674002" y="14960"/>
+                  <a:pt x="2930878" y="25357"/>
+                  <a:pt x="3160765" y="0"/>
+                </a:cubicBezTo>
+                <a:cubicBezTo>
+                  <a:pt x="3390652" y="-25357"/>
+                  <a:pt x="3618233" y="22549"/>
+                  <a:pt x="3984158" y="0"/>
+                </a:cubicBezTo>
+                <a:cubicBezTo>
+                  <a:pt x="3984038" y="195374"/>
+                  <a:pt x="3982039" y="245726"/>
+                  <a:pt x="3984158" y="464739"/>
+                </a:cubicBezTo>
+                <a:cubicBezTo>
+                  <a:pt x="3986277" y="683752"/>
+                  <a:pt x="3968175" y="738445"/>
+                  <a:pt x="3984158" y="959141"/>
+                </a:cubicBezTo>
+                <a:cubicBezTo>
+                  <a:pt x="4000141" y="1179837"/>
+                  <a:pt x="4006929" y="1289598"/>
+                  <a:pt x="3984158" y="1483208"/>
+                </a:cubicBezTo>
+                <a:cubicBezTo>
+                  <a:pt x="3803422" y="1507410"/>
+                  <a:pt x="3621945" y="1507539"/>
+                  <a:pt x="3399815" y="1483208"/>
+                </a:cubicBezTo>
+                <a:cubicBezTo>
+                  <a:pt x="3177685" y="1458877"/>
+                  <a:pt x="2949391" y="1453742"/>
+                  <a:pt x="2735788" y="1483208"/>
+                </a:cubicBezTo>
+                <a:cubicBezTo>
+                  <a:pt x="2522185" y="1512674"/>
+                  <a:pt x="2346462" y="1470132"/>
+                  <a:pt x="2111604" y="1483208"/>
+                </a:cubicBezTo>
+                <a:cubicBezTo>
+                  <a:pt x="1876746" y="1496284"/>
+                  <a:pt x="1574870" y="1492723"/>
+                  <a:pt x="1367894" y="1483208"/>
+                </a:cubicBezTo>
+                <a:cubicBezTo>
+                  <a:pt x="1160918" y="1473694"/>
+                  <a:pt x="788357" y="1457438"/>
+                  <a:pt x="624185" y="1483208"/>
+                </a:cubicBezTo>
+                <a:cubicBezTo>
+                  <a:pt x="460013" y="1508978"/>
+                  <a:pt x="282889" y="1481339"/>
+                  <a:pt x="0" y="1483208"/>
+                </a:cubicBezTo>
+                <a:cubicBezTo>
+                  <a:pt x="24368" y="1316907"/>
+                  <a:pt x="-24567" y="1129752"/>
+                  <a:pt x="0" y="988805"/>
+                </a:cubicBezTo>
+                <a:cubicBezTo>
+                  <a:pt x="24567" y="847858"/>
+                  <a:pt x="2696" y="683175"/>
+                  <a:pt x="0" y="509235"/>
+                </a:cubicBezTo>
+                <a:cubicBezTo>
+                  <a:pt x="-2696" y="335295"/>
+                  <a:pt x="22160" y="109840"/>
                   <a:pt x="0" y="0"/>
                 </a:cubicBezTo>
                 <a:close/>
@@ -13665,6 +13599,44 @@
               <a:rPr lang="en-US" dirty="0"/>
               <a:t>./hello-world</a:t>
             </a:r>
+          </a:p>
+        </p:txBody>
+      </p:sp>
+      <p:sp>
+        <p:nvSpPr>
+          <p:cNvPr id="3" name="TextBox 2">
+            <a:extLst>
+              <a:ext uri="{FF2B5EF4-FFF2-40B4-BE49-F238E27FC236}">
+                <a16:creationId xmlns:a16="http://schemas.microsoft.com/office/drawing/2014/main" id="{CCA0A3CC-AF6B-1EF9-4D6D-4995DE07A3A3}"/>
+              </a:ext>
+            </a:extLst>
+          </p:cNvPr>
+          <p:cNvSpPr txBox="1"/>
+          <p:nvPr/>
+        </p:nvSpPr>
+        <p:spPr>
+          <a:xfrm>
+            <a:off x="156485" y="224498"/>
+            <a:ext cx="4829319" cy="369332"/>
+          </a:xfrm>
+          <a:prstGeom prst="rect">
+            <a:avLst/>
+          </a:prstGeom>
+          <a:noFill/>
+        </p:spPr>
+        <p:txBody>
+          <a:bodyPr wrap="square">
+            <a:spAutoFit/>
+          </a:bodyPr>
+          <a:lstStyle/>
+          <a:p>
+            <a:r>
+              <a:rPr lang="en-US" dirty="0">
+                <a:latin typeface="Gaegu" pitchFamily="2" charset="0"/>
+              </a:rPr>
+              <a:t>Program Execution and Sequence</a:t>
+            </a:r>
+            <a:endParaRPr lang="en-US" b="1" dirty="0"/>
           </a:p>
         </p:txBody>
       </p:sp>
@@ -15085,7 +15057,13 @@
               <a:buAutoNum type="arabicPeriod"/>
             </a:pPr>
             <a:r>
-              <a:rPr lang="en-US" dirty="0"/>
+              <a:rPr lang="en-US" dirty="0">
+                <a:solidFill>
+                  <a:schemeClr val="bg1">
+                    <a:lumMod val="65000"/>
+                  </a:schemeClr>
+                </a:solidFill>
+              </a:rPr>
               <a:t>1001</a:t>
             </a:r>
           </a:p>
@@ -15105,7 +15083,13 @@
               <a:buAutoNum type="arabicPeriod"/>
             </a:pPr>
             <a:r>
-              <a:rPr lang="en-US" dirty="0"/>
+              <a:rPr lang="en-US" dirty="0">
+                <a:solidFill>
+                  <a:schemeClr val="bg1">
+                    <a:lumMod val="65000"/>
+                  </a:schemeClr>
+                </a:solidFill>
+              </a:rPr>
               <a:t>1010</a:t>
             </a:r>
           </a:p>
@@ -15115,7 +15099,13 @@
               <a:buAutoNum type="arabicPeriod"/>
             </a:pPr>
             <a:r>
-              <a:rPr lang="en-US" dirty="0"/>
+              <a:rPr lang="en-US" dirty="0">
+                <a:solidFill>
+                  <a:schemeClr val="bg1">
+                    <a:lumMod val="65000"/>
+                  </a:schemeClr>
+                </a:solidFill>
+              </a:rPr>
               <a:t>1101</a:t>
             </a:r>
           </a:p>
@@ -15125,7 +15115,13 @@
               <a:buAutoNum type="arabicPeriod"/>
             </a:pPr>
             <a:r>
-              <a:rPr lang="en-US" dirty="0"/>
+              <a:rPr lang="en-US" dirty="0">
+                <a:solidFill>
+                  <a:schemeClr val="bg1">
+                    <a:lumMod val="65000"/>
+                  </a:schemeClr>
+                </a:solidFill>
+              </a:rPr>
               <a:t>1111</a:t>
             </a:r>
           </a:p>
@@ -15135,7 +15131,13 @@
               <a:buAutoNum type="arabicPeriod"/>
             </a:pPr>
             <a:r>
-              <a:rPr lang="en-US" dirty="0"/>
+              <a:rPr lang="en-US" dirty="0">
+                <a:solidFill>
+                  <a:schemeClr val="bg1">
+                    <a:lumMod val="65000"/>
+                  </a:schemeClr>
+                </a:solidFill>
+              </a:rPr>
               <a:t>1001</a:t>
             </a:r>
           </a:p>
@@ -15819,60 +15821,44 @@
           <a:custGeom>
             <a:avLst/>
             <a:gdLst>
-              <a:gd name="connsiteX0" fmla="*/ 0 w 6685443"/>
-              <a:gd name="connsiteY0" fmla="*/ 0 h 1815499"/>
-              <a:gd name="connsiteX1" fmla="*/ 601690 w 6685443"/>
-              <a:gd name="connsiteY1" fmla="*/ 0 h 1815499"/>
-              <a:gd name="connsiteX2" fmla="*/ 1069671 w 6685443"/>
-              <a:gd name="connsiteY2" fmla="*/ 0 h 1815499"/>
-              <a:gd name="connsiteX3" fmla="*/ 1871924 w 6685443"/>
-              <a:gd name="connsiteY3" fmla="*/ 0 h 1815499"/>
-              <a:gd name="connsiteX4" fmla="*/ 2473614 w 6685443"/>
-              <a:gd name="connsiteY4" fmla="*/ 0 h 1815499"/>
-              <a:gd name="connsiteX5" fmla="*/ 3075304 w 6685443"/>
-              <a:gd name="connsiteY5" fmla="*/ 0 h 1815499"/>
-              <a:gd name="connsiteX6" fmla="*/ 3877557 w 6685443"/>
-              <a:gd name="connsiteY6" fmla="*/ 0 h 1815499"/>
-              <a:gd name="connsiteX7" fmla="*/ 4412392 w 6685443"/>
-              <a:gd name="connsiteY7" fmla="*/ 0 h 1815499"/>
-              <a:gd name="connsiteX8" fmla="*/ 5214646 w 6685443"/>
-              <a:gd name="connsiteY8" fmla="*/ 0 h 1815499"/>
-              <a:gd name="connsiteX9" fmla="*/ 6016899 w 6685443"/>
-              <a:gd name="connsiteY9" fmla="*/ 0 h 1815499"/>
-              <a:gd name="connsiteX10" fmla="*/ 6685443 w 6685443"/>
-              <a:gd name="connsiteY10" fmla="*/ 0 h 1815499"/>
-              <a:gd name="connsiteX11" fmla="*/ 6685443 w 6685443"/>
-              <a:gd name="connsiteY11" fmla="*/ 641476 h 1815499"/>
-              <a:gd name="connsiteX12" fmla="*/ 6685443 w 6685443"/>
-              <a:gd name="connsiteY12" fmla="*/ 1264798 h 1815499"/>
-              <a:gd name="connsiteX13" fmla="*/ 6685443 w 6685443"/>
-              <a:gd name="connsiteY13" fmla="*/ 1815499 h 1815499"/>
-              <a:gd name="connsiteX14" fmla="*/ 6016899 w 6685443"/>
-              <a:gd name="connsiteY14" fmla="*/ 1815499 h 1815499"/>
-              <a:gd name="connsiteX15" fmla="*/ 5482063 w 6685443"/>
-              <a:gd name="connsiteY15" fmla="*/ 1815499 h 1815499"/>
-              <a:gd name="connsiteX16" fmla="*/ 4813519 w 6685443"/>
-              <a:gd name="connsiteY16" fmla="*/ 1815499 h 1815499"/>
-              <a:gd name="connsiteX17" fmla="*/ 4011266 w 6685443"/>
-              <a:gd name="connsiteY17" fmla="*/ 1815499 h 1815499"/>
-              <a:gd name="connsiteX18" fmla="*/ 3342722 w 6685443"/>
-              <a:gd name="connsiteY18" fmla="*/ 1815499 h 1815499"/>
-              <a:gd name="connsiteX19" fmla="*/ 2874740 w 6685443"/>
-              <a:gd name="connsiteY19" fmla="*/ 1815499 h 1815499"/>
-              <a:gd name="connsiteX20" fmla="*/ 2339905 w 6685443"/>
-              <a:gd name="connsiteY20" fmla="*/ 1815499 h 1815499"/>
-              <a:gd name="connsiteX21" fmla="*/ 1537652 w 6685443"/>
-              <a:gd name="connsiteY21" fmla="*/ 1815499 h 1815499"/>
-              <a:gd name="connsiteX22" fmla="*/ 869108 w 6685443"/>
-              <a:gd name="connsiteY22" fmla="*/ 1815499 h 1815499"/>
-              <a:gd name="connsiteX23" fmla="*/ 0 w 6685443"/>
-              <a:gd name="connsiteY23" fmla="*/ 1815499 h 1815499"/>
-              <a:gd name="connsiteX24" fmla="*/ 0 w 6685443"/>
-              <a:gd name="connsiteY24" fmla="*/ 1210333 h 1815499"/>
-              <a:gd name="connsiteX25" fmla="*/ 0 w 6685443"/>
-              <a:gd name="connsiteY25" fmla="*/ 659631 h 1815499"/>
-              <a:gd name="connsiteX26" fmla="*/ 0 w 6685443"/>
-              <a:gd name="connsiteY26" fmla="*/ 0 h 1815499"/>
+              <a:gd name="connsiteX0" fmla="*/ 0 w 3984158"/>
+              <a:gd name="connsiteY0" fmla="*/ 0 h 1483208"/>
+              <a:gd name="connsiteX1" fmla="*/ 624185 w 3984158"/>
+              <a:gd name="connsiteY1" fmla="*/ 0 h 1483208"/>
+              <a:gd name="connsiteX2" fmla="*/ 1168686 w 3984158"/>
+              <a:gd name="connsiteY2" fmla="*/ 0 h 1483208"/>
+              <a:gd name="connsiteX3" fmla="*/ 1912396 w 3984158"/>
+              <a:gd name="connsiteY3" fmla="*/ 0 h 1483208"/>
+              <a:gd name="connsiteX4" fmla="*/ 2536581 w 3984158"/>
+              <a:gd name="connsiteY4" fmla="*/ 0 h 1483208"/>
+              <a:gd name="connsiteX5" fmla="*/ 3160765 w 3984158"/>
+              <a:gd name="connsiteY5" fmla="*/ 0 h 1483208"/>
+              <a:gd name="connsiteX6" fmla="*/ 3984158 w 3984158"/>
+              <a:gd name="connsiteY6" fmla="*/ 0 h 1483208"/>
+              <a:gd name="connsiteX7" fmla="*/ 3984158 w 3984158"/>
+              <a:gd name="connsiteY7" fmla="*/ 464739 h 1483208"/>
+              <a:gd name="connsiteX8" fmla="*/ 3984158 w 3984158"/>
+              <a:gd name="connsiteY8" fmla="*/ 959141 h 1483208"/>
+              <a:gd name="connsiteX9" fmla="*/ 3984158 w 3984158"/>
+              <a:gd name="connsiteY9" fmla="*/ 1483208 h 1483208"/>
+              <a:gd name="connsiteX10" fmla="*/ 3399815 w 3984158"/>
+              <a:gd name="connsiteY10" fmla="*/ 1483208 h 1483208"/>
+              <a:gd name="connsiteX11" fmla="*/ 2735788 w 3984158"/>
+              <a:gd name="connsiteY11" fmla="*/ 1483208 h 1483208"/>
+              <a:gd name="connsiteX12" fmla="*/ 2111604 w 3984158"/>
+              <a:gd name="connsiteY12" fmla="*/ 1483208 h 1483208"/>
+              <a:gd name="connsiteX13" fmla="*/ 1367894 w 3984158"/>
+              <a:gd name="connsiteY13" fmla="*/ 1483208 h 1483208"/>
+              <a:gd name="connsiteX14" fmla="*/ 624185 w 3984158"/>
+              <a:gd name="connsiteY14" fmla="*/ 1483208 h 1483208"/>
+              <a:gd name="connsiteX15" fmla="*/ 0 w 3984158"/>
+              <a:gd name="connsiteY15" fmla="*/ 1483208 h 1483208"/>
+              <a:gd name="connsiteX16" fmla="*/ 0 w 3984158"/>
+              <a:gd name="connsiteY16" fmla="*/ 988805 h 1483208"/>
+              <a:gd name="connsiteX17" fmla="*/ 0 w 3984158"/>
+              <a:gd name="connsiteY17" fmla="*/ 509235 h 1483208"/>
+              <a:gd name="connsiteX18" fmla="*/ 0 w 3984158"/>
+              <a:gd name="connsiteY18" fmla="*/ 0 h 1483208"/>
             </a:gdLst>
             <a:ahLst/>
             <a:cxnLst>
@@ -15933,165 +15919,101 @@
               <a:cxn ang="0">
                 <a:pos x="connsiteX18" y="connsiteY18"/>
               </a:cxn>
-              <a:cxn ang="0">
-                <a:pos x="connsiteX19" y="connsiteY19"/>
-              </a:cxn>
-              <a:cxn ang="0">
-                <a:pos x="connsiteX20" y="connsiteY20"/>
-              </a:cxn>
-              <a:cxn ang="0">
-                <a:pos x="connsiteX21" y="connsiteY21"/>
-              </a:cxn>
-              <a:cxn ang="0">
-                <a:pos x="connsiteX22" y="connsiteY22"/>
-              </a:cxn>
-              <a:cxn ang="0">
-                <a:pos x="connsiteX23" y="connsiteY23"/>
-              </a:cxn>
-              <a:cxn ang="0">
-                <a:pos x="connsiteX24" y="connsiteY24"/>
-              </a:cxn>
-              <a:cxn ang="0">
-                <a:pos x="connsiteX25" y="connsiteY25"/>
-              </a:cxn>
-              <a:cxn ang="0">
-                <a:pos x="connsiteX26" y="connsiteY26"/>
-              </a:cxn>
             </a:cxnLst>
             <a:rect l="l" t="t" r="r" b="b"/>
             <a:pathLst>
-              <a:path w="6685443" h="1815499" extrusionOk="0">
+              <a:path w="3984158" h="1483208" extrusionOk="0">
                 <a:moveTo>
                   <a:pt x="0" y="0"/>
                 </a:moveTo>
                 <a:cubicBezTo>
-                  <a:pt x="197687" y="5421"/>
-                  <a:pt x="392637" y="-27165"/>
-                  <a:pt x="601690" y="0"/>
-                </a:cubicBezTo>
-                <a:cubicBezTo>
-                  <a:pt x="810743" y="27165"/>
-                  <a:pt x="967174" y="20034"/>
-                  <a:pt x="1069671" y="0"/>
-                </a:cubicBezTo>
-                <a:cubicBezTo>
-                  <a:pt x="1172168" y="-20034"/>
-                  <a:pt x="1481114" y="26288"/>
-                  <a:pt x="1871924" y="0"/>
-                </a:cubicBezTo>
-                <a:cubicBezTo>
-                  <a:pt x="2262734" y="-26288"/>
-                  <a:pt x="2275646" y="9816"/>
-                  <a:pt x="2473614" y="0"/>
-                </a:cubicBezTo>
-                <a:cubicBezTo>
-                  <a:pt x="2671582" y="-9816"/>
-                  <a:pt x="2837715" y="-16866"/>
-                  <a:pt x="3075304" y="0"/>
-                </a:cubicBezTo>
-                <a:cubicBezTo>
-                  <a:pt x="3312893" y="16866"/>
-                  <a:pt x="3565082" y="13656"/>
-                  <a:pt x="3877557" y="0"/>
-                </a:cubicBezTo>
-                <a:cubicBezTo>
-                  <a:pt x="4190032" y="-13656"/>
-                  <a:pt x="4275680" y="23045"/>
-                  <a:pt x="4412392" y="0"/>
-                </a:cubicBezTo>
-                <a:cubicBezTo>
-                  <a:pt x="4549105" y="-23045"/>
-                  <a:pt x="4974381" y="13533"/>
-                  <a:pt x="5214646" y="0"/>
-                </a:cubicBezTo>
-                <a:cubicBezTo>
-                  <a:pt x="5454911" y="-13533"/>
-                  <a:pt x="5621382" y="6072"/>
-                  <a:pt x="6016899" y="0"/>
-                </a:cubicBezTo>
-                <a:cubicBezTo>
-                  <a:pt x="6412416" y="-6072"/>
-                  <a:pt x="6368099" y="-22480"/>
-                  <a:pt x="6685443" y="0"/>
-                </a:cubicBezTo>
-                <a:cubicBezTo>
-                  <a:pt x="6675060" y="141143"/>
-                  <a:pt x="6688790" y="422707"/>
-                  <a:pt x="6685443" y="641476"/>
-                </a:cubicBezTo>
-                <a:cubicBezTo>
-                  <a:pt x="6682096" y="860245"/>
-                  <a:pt x="6676921" y="1110529"/>
-                  <a:pt x="6685443" y="1264798"/>
-                </a:cubicBezTo>
-                <a:cubicBezTo>
-                  <a:pt x="6693965" y="1419067"/>
-                  <a:pt x="6712438" y="1626237"/>
-                  <a:pt x="6685443" y="1815499"/>
-                </a:cubicBezTo>
-                <a:cubicBezTo>
-                  <a:pt x="6531485" y="1826631"/>
-                  <a:pt x="6258288" y="1826162"/>
-                  <a:pt x="6016899" y="1815499"/>
-                </a:cubicBezTo>
-                <a:cubicBezTo>
-                  <a:pt x="5775510" y="1804836"/>
-                  <a:pt x="5635687" y="1808580"/>
-                  <a:pt x="5482063" y="1815499"/>
-                </a:cubicBezTo>
-                <a:cubicBezTo>
-                  <a:pt x="5328439" y="1822418"/>
-                  <a:pt x="4969533" y="1798322"/>
-                  <a:pt x="4813519" y="1815499"/>
-                </a:cubicBezTo>
-                <a:cubicBezTo>
-                  <a:pt x="4657505" y="1832676"/>
-                  <a:pt x="4277484" y="1797792"/>
-                  <a:pt x="4011266" y="1815499"/>
-                </a:cubicBezTo>
-                <a:cubicBezTo>
-                  <a:pt x="3745048" y="1833206"/>
-                  <a:pt x="3503887" y="1798854"/>
-                  <a:pt x="3342722" y="1815499"/>
-                </a:cubicBezTo>
-                <a:cubicBezTo>
-                  <a:pt x="3181557" y="1832144"/>
-                  <a:pt x="3094655" y="1808958"/>
-                  <a:pt x="2874740" y="1815499"/>
-                </a:cubicBezTo>
-                <a:cubicBezTo>
-                  <a:pt x="2654825" y="1822040"/>
-                  <a:pt x="2552356" y="1810430"/>
-                  <a:pt x="2339905" y="1815499"/>
-                </a:cubicBezTo>
-                <a:cubicBezTo>
-                  <a:pt x="2127454" y="1820568"/>
-                  <a:pt x="1825409" y="1807327"/>
-                  <a:pt x="1537652" y="1815499"/>
-                </a:cubicBezTo>
-                <a:cubicBezTo>
-                  <a:pt x="1249895" y="1823671"/>
-                  <a:pt x="1086879" y="1834794"/>
-                  <a:pt x="869108" y="1815499"/>
-                </a:cubicBezTo>
-                <a:cubicBezTo>
-                  <a:pt x="651337" y="1796204"/>
-                  <a:pt x="264417" y="1828267"/>
-                  <a:pt x="0" y="1815499"/>
-                </a:cubicBezTo>
-                <a:cubicBezTo>
-                  <a:pt x="8313" y="1520428"/>
-                  <a:pt x="-1936" y="1449694"/>
-                  <a:pt x="0" y="1210333"/>
-                </a:cubicBezTo>
-                <a:cubicBezTo>
-                  <a:pt x="1936" y="970972"/>
-                  <a:pt x="16209" y="905402"/>
-                  <a:pt x="0" y="659631"/>
-                </a:cubicBezTo>
-                <a:cubicBezTo>
-                  <a:pt x="-16209" y="413860"/>
-                  <a:pt x="-15680" y="309233"/>
+                  <a:pt x="183423" y="18876"/>
+                  <a:pt x="387432" y="11885"/>
+                  <a:pt x="624185" y="0"/>
+                </a:cubicBezTo>
+                <a:cubicBezTo>
+                  <a:pt x="860939" y="-11885"/>
+                  <a:pt x="1054606" y="-18463"/>
+                  <a:pt x="1168686" y="0"/>
+                </a:cubicBezTo>
+                <a:cubicBezTo>
+                  <a:pt x="1282766" y="18463"/>
+                  <a:pt x="1693901" y="35828"/>
+                  <a:pt x="1912396" y="0"/>
+                </a:cubicBezTo>
+                <a:cubicBezTo>
+                  <a:pt x="2130891" y="-35828"/>
+                  <a:pt x="2399161" y="-14960"/>
+                  <a:pt x="2536581" y="0"/>
+                </a:cubicBezTo>
+                <a:cubicBezTo>
+                  <a:pt x="2674002" y="14960"/>
+                  <a:pt x="2930878" y="25357"/>
+                  <a:pt x="3160765" y="0"/>
+                </a:cubicBezTo>
+                <a:cubicBezTo>
+                  <a:pt x="3390652" y="-25357"/>
+                  <a:pt x="3618233" y="22549"/>
+                  <a:pt x="3984158" y="0"/>
+                </a:cubicBezTo>
+                <a:cubicBezTo>
+                  <a:pt x="3984038" y="195374"/>
+                  <a:pt x="3982039" y="245726"/>
+                  <a:pt x="3984158" y="464739"/>
+                </a:cubicBezTo>
+                <a:cubicBezTo>
+                  <a:pt x="3986277" y="683752"/>
+                  <a:pt x="3968175" y="738445"/>
+                  <a:pt x="3984158" y="959141"/>
+                </a:cubicBezTo>
+                <a:cubicBezTo>
+                  <a:pt x="4000141" y="1179837"/>
+                  <a:pt x="4006929" y="1289598"/>
+                  <a:pt x="3984158" y="1483208"/>
+                </a:cubicBezTo>
+                <a:cubicBezTo>
+                  <a:pt x="3803422" y="1507410"/>
+                  <a:pt x="3621945" y="1507539"/>
+                  <a:pt x="3399815" y="1483208"/>
+                </a:cubicBezTo>
+                <a:cubicBezTo>
+                  <a:pt x="3177685" y="1458877"/>
+                  <a:pt x="2949391" y="1453742"/>
+                  <a:pt x="2735788" y="1483208"/>
+                </a:cubicBezTo>
+                <a:cubicBezTo>
+                  <a:pt x="2522185" y="1512674"/>
+                  <a:pt x="2346462" y="1470132"/>
+                  <a:pt x="2111604" y="1483208"/>
+                </a:cubicBezTo>
+                <a:cubicBezTo>
+                  <a:pt x="1876746" y="1496284"/>
+                  <a:pt x="1574870" y="1492723"/>
+                  <a:pt x="1367894" y="1483208"/>
+                </a:cubicBezTo>
+                <a:cubicBezTo>
+                  <a:pt x="1160918" y="1473694"/>
+                  <a:pt x="788357" y="1457438"/>
+                  <a:pt x="624185" y="1483208"/>
+                </a:cubicBezTo>
+                <a:cubicBezTo>
+                  <a:pt x="460013" y="1508978"/>
+                  <a:pt x="282889" y="1481339"/>
+                  <a:pt x="0" y="1483208"/>
+                </a:cubicBezTo>
+                <a:cubicBezTo>
+                  <a:pt x="24368" y="1316907"/>
+                  <a:pt x="-24567" y="1129752"/>
+                  <a:pt x="0" y="988805"/>
+                </a:cubicBezTo>
+                <a:cubicBezTo>
+                  <a:pt x="24567" y="847858"/>
+                  <a:pt x="2696" y="683175"/>
+                  <a:pt x="0" y="509235"/>
+                </a:cubicBezTo>
+                <a:cubicBezTo>
+                  <a:pt x="-2696" y="335295"/>
+                  <a:pt x="22160" y="109840"/>
                   <a:pt x="0" y="0"/>
                 </a:cubicBezTo>
                 <a:close/>
@@ -16335,6 +16257,44 @@
               <a:rPr lang="en-US" dirty="0"/>
               <a:t>./hello-world</a:t>
             </a:r>
+          </a:p>
+        </p:txBody>
+      </p:sp>
+      <p:sp>
+        <p:nvSpPr>
+          <p:cNvPr id="3" name="TextBox 2">
+            <a:extLst>
+              <a:ext uri="{FF2B5EF4-FFF2-40B4-BE49-F238E27FC236}">
+                <a16:creationId xmlns:a16="http://schemas.microsoft.com/office/drawing/2014/main" id="{DE92BC4B-B002-C873-B4A1-C94250CC1377}"/>
+              </a:ext>
+            </a:extLst>
+          </p:cNvPr>
+          <p:cNvSpPr txBox="1"/>
+          <p:nvPr/>
+        </p:nvSpPr>
+        <p:spPr>
+          <a:xfrm>
+            <a:off x="156485" y="224498"/>
+            <a:ext cx="4829319" cy="369332"/>
+          </a:xfrm>
+          <a:prstGeom prst="rect">
+            <a:avLst/>
+          </a:prstGeom>
+          <a:noFill/>
+        </p:spPr>
+        <p:txBody>
+          <a:bodyPr wrap="square">
+            <a:spAutoFit/>
+          </a:bodyPr>
+          <a:lstStyle/>
+          <a:p>
+            <a:r>
+              <a:rPr lang="en-US" dirty="0">
+                <a:latin typeface="Gaegu" pitchFamily="2" charset="0"/>
+              </a:rPr>
+              <a:t>Program Execution and Sequence</a:t>
+            </a:r>
+            <a:endParaRPr lang="en-US" b="1" dirty="0"/>
           </a:p>
         </p:txBody>
       </p:sp>
@@ -17755,7 +17715,13 @@
               <a:buAutoNum type="arabicPeriod"/>
             </a:pPr>
             <a:r>
-              <a:rPr lang="en-US" dirty="0"/>
+              <a:rPr lang="en-US" dirty="0">
+                <a:solidFill>
+                  <a:schemeClr val="bg1">
+                    <a:lumMod val="65000"/>
+                  </a:schemeClr>
+                </a:solidFill>
+              </a:rPr>
               <a:t>1001</a:t>
             </a:r>
           </a:p>
@@ -17775,7 +17741,13 @@
               <a:buAutoNum type="arabicPeriod"/>
             </a:pPr>
             <a:r>
-              <a:rPr lang="en-US" dirty="0"/>
+              <a:rPr lang="en-US" dirty="0">
+                <a:solidFill>
+                  <a:schemeClr val="bg1">
+                    <a:lumMod val="65000"/>
+                  </a:schemeClr>
+                </a:solidFill>
+              </a:rPr>
               <a:t>1010</a:t>
             </a:r>
           </a:p>
@@ -17785,7 +17757,13 @@
               <a:buAutoNum type="arabicPeriod"/>
             </a:pPr>
             <a:r>
-              <a:rPr lang="en-US" dirty="0"/>
+              <a:rPr lang="en-US" dirty="0">
+                <a:solidFill>
+                  <a:schemeClr val="bg1">
+                    <a:lumMod val="65000"/>
+                  </a:schemeClr>
+                </a:solidFill>
+              </a:rPr>
               <a:t>1101</a:t>
             </a:r>
           </a:p>
@@ -17795,7 +17773,13 @@
               <a:buAutoNum type="arabicPeriod"/>
             </a:pPr>
             <a:r>
-              <a:rPr lang="en-US" dirty="0"/>
+              <a:rPr lang="en-US" dirty="0">
+                <a:solidFill>
+                  <a:schemeClr val="bg1">
+                    <a:lumMod val="65000"/>
+                  </a:schemeClr>
+                </a:solidFill>
+              </a:rPr>
               <a:t>1111</a:t>
             </a:r>
           </a:p>
@@ -17805,7 +17789,13 @@
               <a:buAutoNum type="arabicPeriod"/>
             </a:pPr>
             <a:r>
-              <a:rPr lang="en-US" dirty="0"/>
+              <a:rPr lang="en-US" dirty="0">
+                <a:solidFill>
+                  <a:schemeClr val="bg1">
+                    <a:lumMod val="65000"/>
+                  </a:schemeClr>
+                </a:solidFill>
+              </a:rPr>
               <a:t>1001</a:t>
             </a:r>
           </a:p>
@@ -18433,60 +18423,44 @@
           <a:custGeom>
             <a:avLst/>
             <a:gdLst>
-              <a:gd name="connsiteX0" fmla="*/ 0 w 6685443"/>
-              <a:gd name="connsiteY0" fmla="*/ 0 h 1815499"/>
-              <a:gd name="connsiteX1" fmla="*/ 601690 w 6685443"/>
-              <a:gd name="connsiteY1" fmla="*/ 0 h 1815499"/>
-              <a:gd name="connsiteX2" fmla="*/ 1069671 w 6685443"/>
-              <a:gd name="connsiteY2" fmla="*/ 0 h 1815499"/>
-              <a:gd name="connsiteX3" fmla="*/ 1871924 w 6685443"/>
-              <a:gd name="connsiteY3" fmla="*/ 0 h 1815499"/>
-              <a:gd name="connsiteX4" fmla="*/ 2473614 w 6685443"/>
-              <a:gd name="connsiteY4" fmla="*/ 0 h 1815499"/>
-              <a:gd name="connsiteX5" fmla="*/ 3075304 w 6685443"/>
-              <a:gd name="connsiteY5" fmla="*/ 0 h 1815499"/>
-              <a:gd name="connsiteX6" fmla="*/ 3877557 w 6685443"/>
-              <a:gd name="connsiteY6" fmla="*/ 0 h 1815499"/>
-              <a:gd name="connsiteX7" fmla="*/ 4412392 w 6685443"/>
-              <a:gd name="connsiteY7" fmla="*/ 0 h 1815499"/>
-              <a:gd name="connsiteX8" fmla="*/ 5214646 w 6685443"/>
-              <a:gd name="connsiteY8" fmla="*/ 0 h 1815499"/>
-              <a:gd name="connsiteX9" fmla="*/ 6016899 w 6685443"/>
-              <a:gd name="connsiteY9" fmla="*/ 0 h 1815499"/>
-              <a:gd name="connsiteX10" fmla="*/ 6685443 w 6685443"/>
-              <a:gd name="connsiteY10" fmla="*/ 0 h 1815499"/>
-              <a:gd name="connsiteX11" fmla="*/ 6685443 w 6685443"/>
-              <a:gd name="connsiteY11" fmla="*/ 641476 h 1815499"/>
-              <a:gd name="connsiteX12" fmla="*/ 6685443 w 6685443"/>
-              <a:gd name="connsiteY12" fmla="*/ 1264798 h 1815499"/>
-              <a:gd name="connsiteX13" fmla="*/ 6685443 w 6685443"/>
-              <a:gd name="connsiteY13" fmla="*/ 1815499 h 1815499"/>
-              <a:gd name="connsiteX14" fmla="*/ 6016899 w 6685443"/>
-              <a:gd name="connsiteY14" fmla="*/ 1815499 h 1815499"/>
-              <a:gd name="connsiteX15" fmla="*/ 5482063 w 6685443"/>
-              <a:gd name="connsiteY15" fmla="*/ 1815499 h 1815499"/>
-              <a:gd name="connsiteX16" fmla="*/ 4813519 w 6685443"/>
-              <a:gd name="connsiteY16" fmla="*/ 1815499 h 1815499"/>
-              <a:gd name="connsiteX17" fmla="*/ 4011266 w 6685443"/>
-              <a:gd name="connsiteY17" fmla="*/ 1815499 h 1815499"/>
-              <a:gd name="connsiteX18" fmla="*/ 3342722 w 6685443"/>
-              <a:gd name="connsiteY18" fmla="*/ 1815499 h 1815499"/>
-              <a:gd name="connsiteX19" fmla="*/ 2874740 w 6685443"/>
-              <a:gd name="connsiteY19" fmla="*/ 1815499 h 1815499"/>
-              <a:gd name="connsiteX20" fmla="*/ 2339905 w 6685443"/>
-              <a:gd name="connsiteY20" fmla="*/ 1815499 h 1815499"/>
-              <a:gd name="connsiteX21" fmla="*/ 1537652 w 6685443"/>
-              <a:gd name="connsiteY21" fmla="*/ 1815499 h 1815499"/>
-              <a:gd name="connsiteX22" fmla="*/ 869108 w 6685443"/>
-              <a:gd name="connsiteY22" fmla="*/ 1815499 h 1815499"/>
-              <a:gd name="connsiteX23" fmla="*/ 0 w 6685443"/>
-              <a:gd name="connsiteY23" fmla="*/ 1815499 h 1815499"/>
-              <a:gd name="connsiteX24" fmla="*/ 0 w 6685443"/>
-              <a:gd name="connsiteY24" fmla="*/ 1210333 h 1815499"/>
-              <a:gd name="connsiteX25" fmla="*/ 0 w 6685443"/>
-              <a:gd name="connsiteY25" fmla="*/ 659631 h 1815499"/>
-              <a:gd name="connsiteX26" fmla="*/ 0 w 6685443"/>
-              <a:gd name="connsiteY26" fmla="*/ 0 h 1815499"/>
+              <a:gd name="connsiteX0" fmla="*/ 0 w 3984158"/>
+              <a:gd name="connsiteY0" fmla="*/ 0 h 1483208"/>
+              <a:gd name="connsiteX1" fmla="*/ 624185 w 3984158"/>
+              <a:gd name="connsiteY1" fmla="*/ 0 h 1483208"/>
+              <a:gd name="connsiteX2" fmla="*/ 1168686 w 3984158"/>
+              <a:gd name="connsiteY2" fmla="*/ 0 h 1483208"/>
+              <a:gd name="connsiteX3" fmla="*/ 1912396 w 3984158"/>
+              <a:gd name="connsiteY3" fmla="*/ 0 h 1483208"/>
+              <a:gd name="connsiteX4" fmla="*/ 2536581 w 3984158"/>
+              <a:gd name="connsiteY4" fmla="*/ 0 h 1483208"/>
+              <a:gd name="connsiteX5" fmla="*/ 3160765 w 3984158"/>
+              <a:gd name="connsiteY5" fmla="*/ 0 h 1483208"/>
+              <a:gd name="connsiteX6" fmla="*/ 3984158 w 3984158"/>
+              <a:gd name="connsiteY6" fmla="*/ 0 h 1483208"/>
+              <a:gd name="connsiteX7" fmla="*/ 3984158 w 3984158"/>
+              <a:gd name="connsiteY7" fmla="*/ 464739 h 1483208"/>
+              <a:gd name="connsiteX8" fmla="*/ 3984158 w 3984158"/>
+              <a:gd name="connsiteY8" fmla="*/ 959141 h 1483208"/>
+              <a:gd name="connsiteX9" fmla="*/ 3984158 w 3984158"/>
+              <a:gd name="connsiteY9" fmla="*/ 1483208 h 1483208"/>
+              <a:gd name="connsiteX10" fmla="*/ 3399815 w 3984158"/>
+              <a:gd name="connsiteY10" fmla="*/ 1483208 h 1483208"/>
+              <a:gd name="connsiteX11" fmla="*/ 2735788 w 3984158"/>
+              <a:gd name="connsiteY11" fmla="*/ 1483208 h 1483208"/>
+              <a:gd name="connsiteX12" fmla="*/ 2111604 w 3984158"/>
+              <a:gd name="connsiteY12" fmla="*/ 1483208 h 1483208"/>
+              <a:gd name="connsiteX13" fmla="*/ 1367894 w 3984158"/>
+              <a:gd name="connsiteY13" fmla="*/ 1483208 h 1483208"/>
+              <a:gd name="connsiteX14" fmla="*/ 624185 w 3984158"/>
+              <a:gd name="connsiteY14" fmla="*/ 1483208 h 1483208"/>
+              <a:gd name="connsiteX15" fmla="*/ 0 w 3984158"/>
+              <a:gd name="connsiteY15" fmla="*/ 1483208 h 1483208"/>
+              <a:gd name="connsiteX16" fmla="*/ 0 w 3984158"/>
+              <a:gd name="connsiteY16" fmla="*/ 988805 h 1483208"/>
+              <a:gd name="connsiteX17" fmla="*/ 0 w 3984158"/>
+              <a:gd name="connsiteY17" fmla="*/ 509235 h 1483208"/>
+              <a:gd name="connsiteX18" fmla="*/ 0 w 3984158"/>
+              <a:gd name="connsiteY18" fmla="*/ 0 h 1483208"/>
             </a:gdLst>
             <a:ahLst/>
             <a:cxnLst>
@@ -18547,165 +18521,101 @@
               <a:cxn ang="0">
                 <a:pos x="connsiteX18" y="connsiteY18"/>
               </a:cxn>
-              <a:cxn ang="0">
-                <a:pos x="connsiteX19" y="connsiteY19"/>
-              </a:cxn>
-              <a:cxn ang="0">
-                <a:pos x="connsiteX20" y="connsiteY20"/>
-              </a:cxn>
-              <a:cxn ang="0">
-                <a:pos x="connsiteX21" y="connsiteY21"/>
-              </a:cxn>
-              <a:cxn ang="0">
-                <a:pos x="connsiteX22" y="connsiteY22"/>
-              </a:cxn>
-              <a:cxn ang="0">
-                <a:pos x="connsiteX23" y="connsiteY23"/>
-              </a:cxn>
-              <a:cxn ang="0">
-                <a:pos x="connsiteX24" y="connsiteY24"/>
-              </a:cxn>
-              <a:cxn ang="0">
-                <a:pos x="connsiteX25" y="connsiteY25"/>
-              </a:cxn>
-              <a:cxn ang="0">
-                <a:pos x="connsiteX26" y="connsiteY26"/>
-              </a:cxn>
             </a:cxnLst>
             <a:rect l="l" t="t" r="r" b="b"/>
             <a:pathLst>
-              <a:path w="6685443" h="1815499" extrusionOk="0">
+              <a:path w="3984158" h="1483208" extrusionOk="0">
                 <a:moveTo>
                   <a:pt x="0" y="0"/>
                 </a:moveTo>
                 <a:cubicBezTo>
-                  <a:pt x="197687" y="5421"/>
-                  <a:pt x="392637" y="-27165"/>
-                  <a:pt x="601690" y="0"/>
-                </a:cubicBezTo>
-                <a:cubicBezTo>
-                  <a:pt x="810743" y="27165"/>
-                  <a:pt x="967174" y="20034"/>
-                  <a:pt x="1069671" y="0"/>
-                </a:cubicBezTo>
-                <a:cubicBezTo>
-                  <a:pt x="1172168" y="-20034"/>
-                  <a:pt x="1481114" y="26288"/>
-                  <a:pt x="1871924" y="0"/>
-                </a:cubicBezTo>
-                <a:cubicBezTo>
-                  <a:pt x="2262734" y="-26288"/>
-                  <a:pt x="2275646" y="9816"/>
-                  <a:pt x="2473614" y="0"/>
-                </a:cubicBezTo>
-                <a:cubicBezTo>
-                  <a:pt x="2671582" y="-9816"/>
-                  <a:pt x="2837715" y="-16866"/>
-                  <a:pt x="3075304" y="0"/>
-                </a:cubicBezTo>
-                <a:cubicBezTo>
-                  <a:pt x="3312893" y="16866"/>
-                  <a:pt x="3565082" y="13656"/>
-                  <a:pt x="3877557" y="0"/>
-                </a:cubicBezTo>
-                <a:cubicBezTo>
-                  <a:pt x="4190032" y="-13656"/>
-                  <a:pt x="4275680" y="23045"/>
-                  <a:pt x="4412392" y="0"/>
-                </a:cubicBezTo>
-                <a:cubicBezTo>
-                  <a:pt x="4549105" y="-23045"/>
-                  <a:pt x="4974381" y="13533"/>
-                  <a:pt x="5214646" y="0"/>
-                </a:cubicBezTo>
-                <a:cubicBezTo>
-                  <a:pt x="5454911" y="-13533"/>
-                  <a:pt x="5621382" y="6072"/>
-                  <a:pt x="6016899" y="0"/>
-                </a:cubicBezTo>
-                <a:cubicBezTo>
-                  <a:pt x="6412416" y="-6072"/>
-                  <a:pt x="6368099" y="-22480"/>
-                  <a:pt x="6685443" y="0"/>
-                </a:cubicBezTo>
-                <a:cubicBezTo>
-                  <a:pt x="6675060" y="141143"/>
-                  <a:pt x="6688790" y="422707"/>
-                  <a:pt x="6685443" y="641476"/>
-                </a:cubicBezTo>
-                <a:cubicBezTo>
-                  <a:pt x="6682096" y="860245"/>
-                  <a:pt x="6676921" y="1110529"/>
-                  <a:pt x="6685443" y="1264798"/>
-                </a:cubicBezTo>
-                <a:cubicBezTo>
-                  <a:pt x="6693965" y="1419067"/>
-                  <a:pt x="6712438" y="1626237"/>
-                  <a:pt x="6685443" y="1815499"/>
-                </a:cubicBezTo>
-                <a:cubicBezTo>
-                  <a:pt x="6531485" y="1826631"/>
-                  <a:pt x="6258288" y="1826162"/>
-                  <a:pt x="6016899" y="1815499"/>
-                </a:cubicBezTo>
-                <a:cubicBezTo>
-                  <a:pt x="5775510" y="1804836"/>
-                  <a:pt x="5635687" y="1808580"/>
-                  <a:pt x="5482063" y="1815499"/>
-                </a:cubicBezTo>
-                <a:cubicBezTo>
-                  <a:pt x="5328439" y="1822418"/>
-                  <a:pt x="4969533" y="1798322"/>
-                  <a:pt x="4813519" y="1815499"/>
-                </a:cubicBezTo>
-                <a:cubicBezTo>
-                  <a:pt x="4657505" y="1832676"/>
-                  <a:pt x="4277484" y="1797792"/>
-                  <a:pt x="4011266" y="1815499"/>
-                </a:cubicBezTo>
-                <a:cubicBezTo>
-                  <a:pt x="3745048" y="1833206"/>
-                  <a:pt x="3503887" y="1798854"/>
-                  <a:pt x="3342722" y="1815499"/>
-                </a:cubicBezTo>
-                <a:cubicBezTo>
-                  <a:pt x="3181557" y="1832144"/>
-                  <a:pt x="3094655" y="1808958"/>
-                  <a:pt x="2874740" y="1815499"/>
-                </a:cubicBezTo>
-                <a:cubicBezTo>
-                  <a:pt x="2654825" y="1822040"/>
-                  <a:pt x="2552356" y="1810430"/>
-                  <a:pt x="2339905" y="1815499"/>
-                </a:cubicBezTo>
-                <a:cubicBezTo>
-                  <a:pt x="2127454" y="1820568"/>
-                  <a:pt x="1825409" y="1807327"/>
-                  <a:pt x="1537652" y="1815499"/>
-                </a:cubicBezTo>
-                <a:cubicBezTo>
-                  <a:pt x="1249895" y="1823671"/>
-                  <a:pt x="1086879" y="1834794"/>
-                  <a:pt x="869108" y="1815499"/>
-                </a:cubicBezTo>
-                <a:cubicBezTo>
-                  <a:pt x="651337" y="1796204"/>
-                  <a:pt x="264417" y="1828267"/>
-                  <a:pt x="0" y="1815499"/>
-                </a:cubicBezTo>
-                <a:cubicBezTo>
-                  <a:pt x="8313" y="1520428"/>
-                  <a:pt x="-1936" y="1449694"/>
-                  <a:pt x="0" y="1210333"/>
-                </a:cubicBezTo>
-                <a:cubicBezTo>
-                  <a:pt x="1936" y="970972"/>
-                  <a:pt x="16209" y="905402"/>
-                  <a:pt x="0" y="659631"/>
-                </a:cubicBezTo>
-                <a:cubicBezTo>
-                  <a:pt x="-16209" y="413860"/>
-                  <a:pt x="-15680" y="309233"/>
+                  <a:pt x="183423" y="18876"/>
+                  <a:pt x="387432" y="11885"/>
+                  <a:pt x="624185" y="0"/>
+                </a:cubicBezTo>
+                <a:cubicBezTo>
+                  <a:pt x="860939" y="-11885"/>
+                  <a:pt x="1054606" y="-18463"/>
+                  <a:pt x="1168686" y="0"/>
+                </a:cubicBezTo>
+                <a:cubicBezTo>
+                  <a:pt x="1282766" y="18463"/>
+                  <a:pt x="1693901" y="35828"/>
+                  <a:pt x="1912396" y="0"/>
+                </a:cubicBezTo>
+                <a:cubicBezTo>
+                  <a:pt x="2130891" y="-35828"/>
+                  <a:pt x="2399161" y="-14960"/>
+                  <a:pt x="2536581" y="0"/>
+                </a:cubicBezTo>
+                <a:cubicBezTo>
+                  <a:pt x="2674002" y="14960"/>
+                  <a:pt x="2930878" y="25357"/>
+                  <a:pt x="3160765" y="0"/>
+                </a:cubicBezTo>
+                <a:cubicBezTo>
+                  <a:pt x="3390652" y="-25357"/>
+                  <a:pt x="3618233" y="22549"/>
+                  <a:pt x="3984158" y="0"/>
+                </a:cubicBezTo>
+                <a:cubicBezTo>
+                  <a:pt x="3984038" y="195374"/>
+                  <a:pt x="3982039" y="245726"/>
+                  <a:pt x="3984158" y="464739"/>
+                </a:cubicBezTo>
+                <a:cubicBezTo>
+                  <a:pt x="3986277" y="683752"/>
+                  <a:pt x="3968175" y="738445"/>
+                  <a:pt x="3984158" y="959141"/>
+                </a:cubicBezTo>
+                <a:cubicBezTo>
+                  <a:pt x="4000141" y="1179837"/>
+                  <a:pt x="4006929" y="1289598"/>
+                  <a:pt x="3984158" y="1483208"/>
+                </a:cubicBezTo>
+                <a:cubicBezTo>
+                  <a:pt x="3803422" y="1507410"/>
+                  <a:pt x="3621945" y="1507539"/>
+                  <a:pt x="3399815" y="1483208"/>
+                </a:cubicBezTo>
+                <a:cubicBezTo>
+                  <a:pt x="3177685" y="1458877"/>
+                  <a:pt x="2949391" y="1453742"/>
+                  <a:pt x="2735788" y="1483208"/>
+                </a:cubicBezTo>
+                <a:cubicBezTo>
+                  <a:pt x="2522185" y="1512674"/>
+                  <a:pt x="2346462" y="1470132"/>
+                  <a:pt x="2111604" y="1483208"/>
+                </a:cubicBezTo>
+                <a:cubicBezTo>
+                  <a:pt x="1876746" y="1496284"/>
+                  <a:pt x="1574870" y="1492723"/>
+                  <a:pt x="1367894" y="1483208"/>
+                </a:cubicBezTo>
+                <a:cubicBezTo>
+                  <a:pt x="1160918" y="1473694"/>
+                  <a:pt x="788357" y="1457438"/>
+                  <a:pt x="624185" y="1483208"/>
+                </a:cubicBezTo>
+                <a:cubicBezTo>
+                  <a:pt x="460013" y="1508978"/>
+                  <a:pt x="282889" y="1481339"/>
+                  <a:pt x="0" y="1483208"/>
+                </a:cubicBezTo>
+                <a:cubicBezTo>
+                  <a:pt x="24368" y="1316907"/>
+                  <a:pt x="-24567" y="1129752"/>
+                  <a:pt x="0" y="988805"/>
+                </a:cubicBezTo>
+                <a:cubicBezTo>
+                  <a:pt x="24567" y="847858"/>
+                  <a:pt x="2696" y="683175"/>
+                  <a:pt x="0" y="509235"/>
+                </a:cubicBezTo>
+                <a:cubicBezTo>
+                  <a:pt x="-2696" y="335295"/>
+                  <a:pt x="22160" y="109840"/>
                   <a:pt x="0" y="0"/>
                 </a:cubicBezTo>
                 <a:close/>
@@ -18949,6 +18859,44 @@
               <a:rPr lang="en-US" dirty="0"/>
               <a:t>./hello-world</a:t>
             </a:r>
+          </a:p>
+        </p:txBody>
+      </p:sp>
+      <p:sp>
+        <p:nvSpPr>
+          <p:cNvPr id="3" name="TextBox 2">
+            <a:extLst>
+              <a:ext uri="{FF2B5EF4-FFF2-40B4-BE49-F238E27FC236}">
+                <a16:creationId xmlns:a16="http://schemas.microsoft.com/office/drawing/2014/main" id="{7FF8E2B5-1EBA-266F-E754-414A6704AE5C}"/>
+              </a:ext>
+            </a:extLst>
+          </p:cNvPr>
+          <p:cNvSpPr txBox="1"/>
+          <p:nvPr/>
+        </p:nvSpPr>
+        <p:spPr>
+          <a:xfrm>
+            <a:off x="156485" y="224498"/>
+            <a:ext cx="4829319" cy="369332"/>
+          </a:xfrm>
+          <a:prstGeom prst="rect">
+            <a:avLst/>
+          </a:prstGeom>
+          <a:noFill/>
+        </p:spPr>
+        <p:txBody>
+          <a:bodyPr wrap="square">
+            <a:spAutoFit/>
+          </a:bodyPr>
+          <a:lstStyle/>
+          <a:p>
+            <a:r>
+              <a:rPr lang="en-US" dirty="0">
+                <a:latin typeface="Gaegu" pitchFamily="2" charset="0"/>
+              </a:rPr>
+              <a:t>Program Execution and Sequence</a:t>
+            </a:r>
+            <a:endParaRPr lang="en-US" b="1" dirty="0"/>
           </a:p>
         </p:txBody>
       </p:sp>
@@ -20929,7 +20877,13 @@
               <a:buAutoNum type="arabicPeriod"/>
             </a:pPr>
             <a:r>
-              <a:rPr lang="en-US" dirty="0"/>
+              <a:rPr lang="en-US" dirty="0">
+                <a:solidFill>
+                  <a:schemeClr val="bg1">
+                    <a:lumMod val="65000"/>
+                  </a:schemeClr>
+                </a:solidFill>
+              </a:rPr>
               <a:t>1001</a:t>
             </a:r>
           </a:p>
@@ -20939,7 +20893,13 @@
               <a:buAutoNum type="arabicPeriod"/>
             </a:pPr>
             <a:r>
-              <a:rPr lang="en-US" dirty="0"/>
+              <a:rPr lang="en-US" dirty="0">
+                <a:solidFill>
+                  <a:schemeClr val="bg1">
+                    <a:lumMod val="65000"/>
+                  </a:schemeClr>
+                </a:solidFill>
+              </a:rPr>
               <a:t>0010</a:t>
             </a:r>
           </a:p>
@@ -20959,7 +20919,13 @@
               <a:buAutoNum type="arabicPeriod"/>
             </a:pPr>
             <a:r>
-              <a:rPr lang="en-US" dirty="0"/>
+              <a:rPr lang="en-US" dirty="0">
+                <a:solidFill>
+                  <a:schemeClr val="bg1">
+                    <a:lumMod val="65000"/>
+                  </a:schemeClr>
+                </a:solidFill>
+              </a:rPr>
               <a:t>1101</a:t>
             </a:r>
           </a:p>
@@ -20969,7 +20935,13 @@
               <a:buAutoNum type="arabicPeriod"/>
             </a:pPr>
             <a:r>
-              <a:rPr lang="en-US" dirty="0"/>
+              <a:rPr lang="en-US" dirty="0">
+                <a:solidFill>
+                  <a:schemeClr val="bg1">
+                    <a:lumMod val="65000"/>
+                  </a:schemeClr>
+                </a:solidFill>
+              </a:rPr>
               <a:t>1111</a:t>
             </a:r>
           </a:p>
@@ -20979,7 +20951,13 @@
               <a:buAutoNum type="arabicPeriod"/>
             </a:pPr>
             <a:r>
-              <a:rPr lang="en-US" dirty="0"/>
+              <a:rPr lang="en-US" dirty="0">
+                <a:solidFill>
+                  <a:schemeClr val="bg1">
+                    <a:lumMod val="65000"/>
+                  </a:schemeClr>
+                </a:solidFill>
+              </a:rPr>
               <a:t>1001</a:t>
             </a:r>
           </a:p>
@@ -21643,6 +21621,44 @@
           </a:fontRef>
         </p:style>
       </p:cxnSp>
+      <p:sp>
+        <p:nvSpPr>
+          <p:cNvPr id="7" name="TextBox 6">
+            <a:extLst>
+              <a:ext uri="{FF2B5EF4-FFF2-40B4-BE49-F238E27FC236}">
+                <a16:creationId xmlns:a16="http://schemas.microsoft.com/office/drawing/2014/main" id="{357676B2-B907-D2AE-A0EF-29A6EA763C58}"/>
+              </a:ext>
+            </a:extLst>
+          </p:cNvPr>
+          <p:cNvSpPr txBox="1"/>
+          <p:nvPr/>
+        </p:nvSpPr>
+        <p:spPr>
+          <a:xfrm>
+            <a:off x="156485" y="224498"/>
+            <a:ext cx="4829319" cy="369332"/>
+          </a:xfrm>
+          <a:prstGeom prst="rect">
+            <a:avLst/>
+          </a:prstGeom>
+          <a:noFill/>
+        </p:spPr>
+        <p:txBody>
+          <a:bodyPr wrap="square">
+            <a:spAutoFit/>
+          </a:bodyPr>
+          <a:lstStyle/>
+          <a:p>
+            <a:r>
+              <a:rPr lang="en-US" dirty="0">
+                <a:latin typeface="Gaegu" pitchFamily="2" charset="0"/>
+              </a:rPr>
+              <a:t>Program Execution and Sequence</a:t>
+            </a:r>
+            <a:endParaRPr lang="en-US" b="1" dirty="0"/>
+          </a:p>
+        </p:txBody>
+      </p:sp>
     </p:spTree>
     <p:extLst>
       <p:ext uri="{BB962C8B-B14F-4D97-AF65-F5344CB8AC3E}">

</xml_diff>

<commit_message>
Remove heading from sequence concept slider.
</commit_message>
<xml_diff>
--- a/resources/ppt-slides/sequence-data-sequence.pptx
+++ b/resources/ppt-slides/sequence-data-sequence.pptx
@@ -249,7 +249,7 @@
           <a:p>
             <a:fld id="{964302DC-9F53-934F-AE4D-0F1F197008C1}" type="datetimeFigureOut">
               <a:rPr lang="en-US" smtClean="0"/>
-              <a:t>11/27/23</a:t>
+              <a:t>1/3/24</a:t>
             </a:fld>
             <a:endParaRPr lang="en-US"/>
           </a:p>
@@ -419,7 +419,7 @@
           <a:p>
             <a:fld id="{964302DC-9F53-934F-AE4D-0F1F197008C1}" type="datetimeFigureOut">
               <a:rPr lang="en-US" smtClean="0"/>
-              <a:t>11/27/23</a:t>
+              <a:t>1/3/24</a:t>
             </a:fld>
             <a:endParaRPr lang="en-US"/>
           </a:p>
@@ -599,7 +599,7 @@
           <a:p>
             <a:fld id="{964302DC-9F53-934F-AE4D-0F1F197008C1}" type="datetimeFigureOut">
               <a:rPr lang="en-US" smtClean="0"/>
-              <a:t>11/27/23</a:t>
+              <a:t>1/3/24</a:t>
             </a:fld>
             <a:endParaRPr lang="en-US"/>
           </a:p>
@@ -769,7 +769,7 @@
           <a:p>
             <a:fld id="{964302DC-9F53-934F-AE4D-0F1F197008C1}" type="datetimeFigureOut">
               <a:rPr lang="en-US" smtClean="0"/>
-              <a:t>11/27/23</a:t>
+              <a:t>1/3/24</a:t>
             </a:fld>
             <a:endParaRPr lang="en-US"/>
           </a:p>
@@ -1013,7 +1013,7 @@
           <a:p>
             <a:fld id="{964302DC-9F53-934F-AE4D-0F1F197008C1}" type="datetimeFigureOut">
               <a:rPr lang="en-US" smtClean="0"/>
-              <a:t>11/27/23</a:t>
+              <a:t>1/3/24</a:t>
             </a:fld>
             <a:endParaRPr lang="en-US"/>
           </a:p>
@@ -1245,7 +1245,7 @@
           <a:p>
             <a:fld id="{964302DC-9F53-934F-AE4D-0F1F197008C1}" type="datetimeFigureOut">
               <a:rPr lang="en-US" smtClean="0"/>
-              <a:t>11/27/23</a:t>
+              <a:t>1/3/24</a:t>
             </a:fld>
             <a:endParaRPr lang="en-US"/>
           </a:p>
@@ -1612,7 +1612,7 @@
           <a:p>
             <a:fld id="{964302DC-9F53-934F-AE4D-0F1F197008C1}" type="datetimeFigureOut">
               <a:rPr lang="en-US" smtClean="0"/>
-              <a:t>11/27/23</a:t>
+              <a:t>1/3/24</a:t>
             </a:fld>
             <a:endParaRPr lang="en-US"/>
           </a:p>
@@ -1730,7 +1730,7 @@
           <a:p>
             <a:fld id="{964302DC-9F53-934F-AE4D-0F1F197008C1}" type="datetimeFigureOut">
               <a:rPr lang="en-US" smtClean="0"/>
-              <a:t>11/27/23</a:t>
+              <a:t>1/3/24</a:t>
             </a:fld>
             <a:endParaRPr lang="en-US"/>
           </a:p>
@@ -1825,7 +1825,7 @@
           <a:p>
             <a:fld id="{964302DC-9F53-934F-AE4D-0F1F197008C1}" type="datetimeFigureOut">
               <a:rPr lang="en-US" smtClean="0"/>
-              <a:t>11/27/23</a:t>
+              <a:t>1/3/24</a:t>
             </a:fld>
             <a:endParaRPr lang="en-US"/>
           </a:p>
@@ -2102,7 +2102,7 @@
           <a:p>
             <a:fld id="{964302DC-9F53-934F-AE4D-0F1F197008C1}" type="datetimeFigureOut">
               <a:rPr lang="en-US" smtClean="0"/>
-              <a:t>11/27/23</a:t>
+              <a:t>1/3/24</a:t>
             </a:fld>
             <a:endParaRPr lang="en-US"/>
           </a:p>
@@ -2359,7 +2359,7 @@
           <a:p>
             <a:fld id="{964302DC-9F53-934F-AE4D-0F1F197008C1}" type="datetimeFigureOut">
               <a:rPr lang="en-US" smtClean="0"/>
-              <a:t>11/27/23</a:t>
+              <a:t>1/3/24</a:t>
             </a:fld>
             <a:endParaRPr lang="en-US"/>
           </a:p>
@@ -2572,7 +2572,7 @@
           <a:p>
             <a:fld id="{964302DC-9F53-934F-AE4D-0F1F197008C1}" type="datetimeFigureOut">
               <a:rPr lang="en-US" smtClean="0"/>
-              <a:t>11/27/23</a:t>
+              <a:t>1/3/24</a:t>
             </a:fld>
             <a:endParaRPr lang="en-US"/>
           </a:p>
@@ -5659,44 +5659,6 @@
           </a:p>
         </p:txBody>
       </p:sp>
-      <p:sp>
-        <p:nvSpPr>
-          <p:cNvPr id="19" name="TextBox 18">
-            <a:extLst>
-              <a:ext uri="{FF2B5EF4-FFF2-40B4-BE49-F238E27FC236}">
-                <a16:creationId xmlns:a16="http://schemas.microsoft.com/office/drawing/2014/main" id="{BBC4C83A-5166-58A4-1F2A-B52ADEC80AEE}"/>
-              </a:ext>
-            </a:extLst>
-          </p:cNvPr>
-          <p:cNvSpPr txBox="1"/>
-          <p:nvPr/>
-        </p:nvSpPr>
-        <p:spPr>
-          <a:xfrm>
-            <a:off x="156485" y="224498"/>
-            <a:ext cx="4829319" cy="369332"/>
-          </a:xfrm>
-          <a:prstGeom prst="rect">
-            <a:avLst/>
-          </a:prstGeom>
-          <a:noFill/>
-        </p:spPr>
-        <p:txBody>
-          <a:bodyPr wrap="square">
-            <a:spAutoFit/>
-          </a:bodyPr>
-          <a:lstStyle/>
-          <a:p>
-            <a:r>
-              <a:rPr lang="en-US" dirty="0">
-                <a:latin typeface="Gaegu" pitchFamily="2" charset="0"/>
-              </a:rPr>
-              <a:t>Program Execution and Sequence</a:t>
-            </a:r>
-            <a:endParaRPr lang="en-US" b="1" dirty="0"/>
-          </a:p>
-        </p:txBody>
-      </p:sp>
     </p:spTree>
     <p:extLst>
       <p:ext uri="{BB962C8B-B14F-4D97-AF65-F5344CB8AC3E}">
@@ -8262,44 +8224,6 @@
               <a:rPr lang="en-US" dirty="0"/>
               <a:t>./hello-world</a:t>
             </a:r>
-          </a:p>
-        </p:txBody>
-      </p:sp>
-      <p:sp>
-        <p:nvSpPr>
-          <p:cNvPr id="3" name="TextBox 2">
-            <a:extLst>
-              <a:ext uri="{FF2B5EF4-FFF2-40B4-BE49-F238E27FC236}">
-                <a16:creationId xmlns:a16="http://schemas.microsoft.com/office/drawing/2014/main" id="{60459823-A484-EC6A-8881-6DECE32BE3BF}"/>
-              </a:ext>
-            </a:extLst>
-          </p:cNvPr>
-          <p:cNvSpPr txBox="1"/>
-          <p:nvPr/>
-        </p:nvSpPr>
-        <p:spPr>
-          <a:xfrm>
-            <a:off x="156485" y="224498"/>
-            <a:ext cx="4829319" cy="369332"/>
-          </a:xfrm>
-          <a:prstGeom prst="rect">
-            <a:avLst/>
-          </a:prstGeom>
-          <a:noFill/>
-        </p:spPr>
-        <p:txBody>
-          <a:bodyPr wrap="square">
-            <a:spAutoFit/>
-          </a:bodyPr>
-          <a:lstStyle/>
-          <a:p>
-            <a:r>
-              <a:rPr lang="en-US" dirty="0">
-                <a:latin typeface="Gaegu" pitchFamily="2" charset="0"/>
-              </a:rPr>
-              <a:t>Program Execution and Sequence</a:t>
-            </a:r>
-            <a:endParaRPr lang="en-US" b="1" dirty="0"/>
           </a:p>
         </p:txBody>
       </p:sp>
@@ -10997,44 +10921,6 @@
               <a:rPr lang="en-US" dirty="0"/>
               <a:t>./hello-world</a:t>
             </a:r>
-          </a:p>
-        </p:txBody>
-      </p:sp>
-      <p:sp>
-        <p:nvSpPr>
-          <p:cNvPr id="3" name="TextBox 2">
-            <a:extLst>
-              <a:ext uri="{FF2B5EF4-FFF2-40B4-BE49-F238E27FC236}">
-                <a16:creationId xmlns:a16="http://schemas.microsoft.com/office/drawing/2014/main" id="{D4B81D6B-CB52-2587-E0AA-D4640619FFF1}"/>
-              </a:ext>
-            </a:extLst>
-          </p:cNvPr>
-          <p:cNvSpPr txBox="1"/>
-          <p:nvPr/>
-        </p:nvSpPr>
-        <p:spPr>
-          <a:xfrm>
-            <a:off x="156485" y="224498"/>
-            <a:ext cx="4829319" cy="369332"/>
-          </a:xfrm>
-          <a:prstGeom prst="rect">
-            <a:avLst/>
-          </a:prstGeom>
-          <a:noFill/>
-        </p:spPr>
-        <p:txBody>
-          <a:bodyPr wrap="square">
-            <a:spAutoFit/>
-          </a:bodyPr>
-          <a:lstStyle/>
-          <a:p>
-            <a:r>
-              <a:rPr lang="en-US" dirty="0">
-                <a:latin typeface="Gaegu" pitchFamily="2" charset="0"/>
-              </a:rPr>
-              <a:t>Program Execution and Sequence</a:t>
-            </a:r>
-            <a:endParaRPr lang="en-US" b="1" dirty="0"/>
           </a:p>
         </p:txBody>
       </p:sp>
@@ -13599,44 +13485,6 @@
               <a:rPr lang="en-US" dirty="0"/>
               <a:t>./hello-world</a:t>
             </a:r>
-          </a:p>
-        </p:txBody>
-      </p:sp>
-      <p:sp>
-        <p:nvSpPr>
-          <p:cNvPr id="3" name="TextBox 2">
-            <a:extLst>
-              <a:ext uri="{FF2B5EF4-FFF2-40B4-BE49-F238E27FC236}">
-                <a16:creationId xmlns:a16="http://schemas.microsoft.com/office/drawing/2014/main" id="{CCA0A3CC-AF6B-1EF9-4D6D-4995DE07A3A3}"/>
-              </a:ext>
-            </a:extLst>
-          </p:cNvPr>
-          <p:cNvSpPr txBox="1"/>
-          <p:nvPr/>
-        </p:nvSpPr>
-        <p:spPr>
-          <a:xfrm>
-            <a:off x="156485" y="224498"/>
-            <a:ext cx="4829319" cy="369332"/>
-          </a:xfrm>
-          <a:prstGeom prst="rect">
-            <a:avLst/>
-          </a:prstGeom>
-          <a:noFill/>
-        </p:spPr>
-        <p:txBody>
-          <a:bodyPr wrap="square">
-            <a:spAutoFit/>
-          </a:bodyPr>
-          <a:lstStyle/>
-          <a:p>
-            <a:r>
-              <a:rPr lang="en-US" dirty="0">
-                <a:latin typeface="Gaegu" pitchFamily="2" charset="0"/>
-              </a:rPr>
-              <a:t>Program Execution and Sequence</a:t>
-            </a:r>
-            <a:endParaRPr lang="en-US" b="1" dirty="0"/>
           </a:p>
         </p:txBody>
       </p:sp>
@@ -16257,44 +16105,6 @@
               <a:rPr lang="en-US" dirty="0"/>
               <a:t>./hello-world</a:t>
             </a:r>
-          </a:p>
-        </p:txBody>
-      </p:sp>
-      <p:sp>
-        <p:nvSpPr>
-          <p:cNvPr id="3" name="TextBox 2">
-            <a:extLst>
-              <a:ext uri="{FF2B5EF4-FFF2-40B4-BE49-F238E27FC236}">
-                <a16:creationId xmlns:a16="http://schemas.microsoft.com/office/drawing/2014/main" id="{DE92BC4B-B002-C873-B4A1-C94250CC1377}"/>
-              </a:ext>
-            </a:extLst>
-          </p:cNvPr>
-          <p:cNvSpPr txBox="1"/>
-          <p:nvPr/>
-        </p:nvSpPr>
-        <p:spPr>
-          <a:xfrm>
-            <a:off x="156485" y="224498"/>
-            <a:ext cx="4829319" cy="369332"/>
-          </a:xfrm>
-          <a:prstGeom prst="rect">
-            <a:avLst/>
-          </a:prstGeom>
-          <a:noFill/>
-        </p:spPr>
-        <p:txBody>
-          <a:bodyPr wrap="square">
-            <a:spAutoFit/>
-          </a:bodyPr>
-          <a:lstStyle/>
-          <a:p>
-            <a:r>
-              <a:rPr lang="en-US" dirty="0">
-                <a:latin typeface="Gaegu" pitchFamily="2" charset="0"/>
-              </a:rPr>
-              <a:t>Program Execution and Sequence</a:t>
-            </a:r>
-            <a:endParaRPr lang="en-US" b="1" dirty="0"/>
           </a:p>
         </p:txBody>
       </p:sp>
@@ -18890,12 +18700,6 @@
           </a:bodyPr>
           <a:lstStyle/>
           <a:p>
-            <a:r>
-              <a:rPr lang="en-US" dirty="0">
-                <a:latin typeface="Gaegu" pitchFamily="2" charset="0"/>
-              </a:rPr>
-              <a:t>Program Execution and Sequence</a:t>
-            </a:r>
             <a:endParaRPr lang="en-US" b="1" dirty="0"/>
           </a:p>
         </p:txBody>
@@ -21649,12 +21453,6 @@
           </a:bodyPr>
           <a:lstStyle/>
           <a:p>
-            <a:r>
-              <a:rPr lang="en-US" dirty="0">
-                <a:latin typeface="Gaegu" pitchFamily="2" charset="0"/>
-              </a:rPr>
-              <a:t>Program Execution and Sequence</a:t>
-            </a:r>
             <a:endParaRPr lang="en-US" b="1" dirty="0"/>
           </a:p>
         </p:txBody>

</xml_diff>